<commit_message>
For real, the final push.
</commit_message>
<xml_diff>
--- a/Presentation.pptx
+++ b/Presentation.pptx
@@ -2513,138 +2513,6 @@
         </a:p>
       </dgm:t>
     </dgm:pt>
-    <dgm:pt modelId="{14EE3551-C957-401B-BE55-6A86EC1BB91D}">
-      <dgm:prSet phldrT="[Text]" phldr="1"/>
-      <dgm:spPr/>
-      <dgm:t>
-        <a:bodyPr/>
-        <a:lstStyle/>
-        <a:p>
-          <a:endParaRPr lang="en-US" dirty="0"/>
-        </a:p>
-      </dgm:t>
-    </dgm:pt>
-    <dgm:pt modelId="{5FE8A452-5873-496E-8782-9717A8384B3D}" type="parTrans" cxnId="{3376FCCA-36BE-48E1-A636-FC7F1AD7E577}">
-      <dgm:prSet/>
-      <dgm:spPr/>
-      <dgm:t>
-        <a:bodyPr/>
-        <a:lstStyle/>
-        <a:p>
-          <a:endParaRPr lang="en-US"/>
-        </a:p>
-      </dgm:t>
-    </dgm:pt>
-    <dgm:pt modelId="{5C65FFE3-0C25-409A-97D3-4C866BF7EA3E}" type="sibTrans" cxnId="{3376FCCA-36BE-48E1-A636-FC7F1AD7E577}">
-      <dgm:prSet/>
-      <dgm:spPr/>
-      <dgm:t>
-        <a:bodyPr/>
-        <a:lstStyle/>
-        <a:p>
-          <a:endParaRPr lang="en-US"/>
-        </a:p>
-      </dgm:t>
-    </dgm:pt>
-    <dgm:pt modelId="{DDC24D32-E1F2-46F3-80DF-2F960C53D79A}">
-      <dgm:prSet phldrT="[Text]" phldr="1"/>
-      <dgm:spPr/>
-      <dgm:t>
-        <a:bodyPr/>
-        <a:lstStyle/>
-        <a:p>
-          <a:endParaRPr lang="en-US" dirty="0"/>
-        </a:p>
-      </dgm:t>
-    </dgm:pt>
-    <dgm:pt modelId="{67F65B4F-411F-4A54-B17C-3850B3FACCFF}" type="parTrans" cxnId="{84CC86D6-1625-4404-B1B0-F2A904189D1B}">
-      <dgm:prSet/>
-      <dgm:spPr/>
-      <dgm:t>
-        <a:bodyPr/>
-        <a:lstStyle/>
-        <a:p>
-          <a:endParaRPr lang="en-US"/>
-        </a:p>
-      </dgm:t>
-    </dgm:pt>
-    <dgm:pt modelId="{6EB03620-DFA9-4125-BF30-A06B825535C2}" type="sibTrans" cxnId="{84CC86D6-1625-4404-B1B0-F2A904189D1B}">
-      <dgm:prSet/>
-      <dgm:spPr/>
-      <dgm:t>
-        <a:bodyPr/>
-        <a:lstStyle/>
-        <a:p>
-          <a:endParaRPr lang="en-US"/>
-        </a:p>
-      </dgm:t>
-    </dgm:pt>
-    <dgm:pt modelId="{5886B898-FE96-4569-92A7-C70ED90E8690}">
-      <dgm:prSet phldrT="[Text]" phldr="1"/>
-      <dgm:spPr/>
-      <dgm:t>
-        <a:bodyPr/>
-        <a:lstStyle/>
-        <a:p>
-          <a:endParaRPr lang="en-US" dirty="0"/>
-        </a:p>
-      </dgm:t>
-    </dgm:pt>
-    <dgm:pt modelId="{BCF51EA3-9D11-4B3B-9765-562538CC1898}" type="parTrans" cxnId="{ADCB8761-0808-40BE-B733-BE4B54EE712C}">
-      <dgm:prSet/>
-      <dgm:spPr/>
-      <dgm:t>
-        <a:bodyPr/>
-        <a:lstStyle/>
-        <a:p>
-          <a:endParaRPr lang="en-US"/>
-        </a:p>
-      </dgm:t>
-    </dgm:pt>
-    <dgm:pt modelId="{90337B25-0C40-4509-8B1F-540451EBA8BC}" type="sibTrans" cxnId="{ADCB8761-0808-40BE-B733-BE4B54EE712C}">
-      <dgm:prSet/>
-      <dgm:spPr/>
-      <dgm:t>
-        <a:bodyPr/>
-        <a:lstStyle/>
-        <a:p>
-          <a:endParaRPr lang="en-US"/>
-        </a:p>
-      </dgm:t>
-    </dgm:pt>
-    <dgm:pt modelId="{DB978D0C-DEB2-49A5-B07B-447C92F3A272}">
-      <dgm:prSet phldrT="[Text]"/>
-      <dgm:spPr/>
-      <dgm:t>
-        <a:bodyPr/>
-        <a:lstStyle/>
-        <a:p>
-          <a:endParaRPr lang="en-US" dirty="0"/>
-        </a:p>
-      </dgm:t>
-    </dgm:pt>
-    <dgm:pt modelId="{DEDDF6F0-D6A2-4663-B980-6E85308EB4A3}" type="parTrans" cxnId="{3ECB7B56-F31A-4B09-8DA8-32AC6D851C82}">
-      <dgm:prSet/>
-      <dgm:spPr/>
-      <dgm:t>
-        <a:bodyPr/>
-        <a:lstStyle/>
-        <a:p>
-          <a:endParaRPr lang="en-US"/>
-        </a:p>
-      </dgm:t>
-    </dgm:pt>
-    <dgm:pt modelId="{22F9C7F2-A160-409E-8E37-2F6805E56DDE}" type="sibTrans" cxnId="{3ECB7B56-F31A-4B09-8DA8-32AC6D851C82}">
-      <dgm:prSet/>
-      <dgm:spPr/>
-      <dgm:t>
-        <a:bodyPr/>
-        <a:lstStyle/>
-        <a:p>
-          <a:endParaRPr lang="en-US"/>
-        </a:p>
-      </dgm:t>
-    </dgm:pt>
     <dgm:pt modelId="{9F9A03C6-DF23-4F03-BE85-24501C33864F}">
       <dgm:prSet phldrT="[Text]"/>
       <dgm:spPr/>
@@ -2676,39 +2544,6 @@
       </dgm:t>
     </dgm:pt>
     <dgm:pt modelId="{BE9A3851-EA3A-4809-B86F-881DF96A815E}" type="sibTrans" cxnId="{08BF7F4D-B4F9-433B-B325-556F123546B0}">
-      <dgm:prSet/>
-      <dgm:spPr/>
-      <dgm:t>
-        <a:bodyPr/>
-        <a:lstStyle/>
-        <a:p>
-          <a:endParaRPr lang="en-US"/>
-        </a:p>
-      </dgm:t>
-    </dgm:pt>
-    <dgm:pt modelId="{10967B6A-F6B4-41B1-8A50-906BDDA355FE}">
-      <dgm:prSet phldrT="[Text]"/>
-      <dgm:spPr/>
-      <dgm:t>
-        <a:bodyPr/>
-        <a:lstStyle/>
-        <a:p>
-          <a:endParaRPr lang="en-US" dirty="0"/>
-        </a:p>
-      </dgm:t>
-    </dgm:pt>
-    <dgm:pt modelId="{6881CB8C-D9FB-41B8-8E96-C1198EBB7111}" type="parTrans" cxnId="{25F2EAEA-B94B-450B-87E4-03701C1C0073}">
-      <dgm:prSet/>
-      <dgm:spPr/>
-      <dgm:t>
-        <a:bodyPr/>
-        <a:lstStyle/>
-        <a:p>
-          <a:endParaRPr lang="en-US"/>
-        </a:p>
-      </dgm:t>
-    </dgm:pt>
-    <dgm:pt modelId="{135223C0-1F85-4624-841E-5902F6870149}" type="sibTrans" cxnId="{25F2EAEA-B94B-450B-87E4-03701C1C0073}">
       <dgm:prSet/>
       <dgm:spPr/>
       <dgm:t>
@@ -2769,10 +2604,6 @@
     </dgm:pt>
     <dgm:pt modelId="{7939B062-BDC8-483B-909B-4E2A2E729CFE}" type="pres">
       <dgm:prSet presAssocID="{C9423769-D2C8-4F94-846B-7D5A16C918E2}" presName="hierFlow" presStyleCnt="0"/>
-      <dgm:spPr/>
-    </dgm:pt>
-    <dgm:pt modelId="{FD490BC2-F399-4417-AE01-4379DD21EB0B}" type="pres">
-      <dgm:prSet presAssocID="{C9423769-D2C8-4F94-846B-7D5A16C918E2}" presName="firstBuf" presStyleCnt="0"/>
       <dgm:spPr/>
     </dgm:pt>
     <dgm:pt modelId="{CDCBC623-5754-4B61-B38C-15EDDFA5C265}" type="pres">
@@ -2869,153 +2700,25 @@
       <dgm:prSet presAssocID="{C9423769-D2C8-4F94-846B-7D5A16C918E2}" presName="bgShapesFlow" presStyleCnt="0"/>
       <dgm:spPr/>
     </dgm:pt>
-    <dgm:pt modelId="{9812C23C-142D-4DA7-8BDB-B80C152169B2}" type="pres">
-      <dgm:prSet presAssocID="{14EE3551-C957-401B-BE55-6A86EC1BB91D}" presName="rectComp" presStyleCnt="0"/>
-      <dgm:spPr/>
-    </dgm:pt>
-    <dgm:pt modelId="{81D8F765-1C2B-47E8-9104-BC25204BF581}" type="pres">
-      <dgm:prSet presAssocID="{14EE3551-C957-401B-BE55-6A86EC1BB91D}" presName="bgRect" presStyleLbl="bgShp" presStyleIdx="0" presStyleCnt="5" custLinFactNeighborX="-7709" custLinFactNeighborY="-29061"/>
-      <dgm:spPr/>
-    </dgm:pt>
-    <dgm:pt modelId="{74E3C15C-C478-4A6D-9FF3-524873CAFEDE}" type="pres">
-      <dgm:prSet presAssocID="{14EE3551-C957-401B-BE55-6A86EC1BB91D}" presName="bgRectTx" presStyleLbl="bgShp" presStyleIdx="0" presStyleCnt="5">
-        <dgm:presLayoutVars>
-          <dgm:bulletEnabled val="1"/>
-        </dgm:presLayoutVars>
-      </dgm:prSet>
-      <dgm:spPr/>
-    </dgm:pt>
-    <dgm:pt modelId="{55BEA8F3-DFE0-4F98-99CE-55A83BCBD8B2}" type="pres">
-      <dgm:prSet presAssocID="{14EE3551-C957-401B-BE55-6A86EC1BB91D}" presName="spComp" presStyleCnt="0"/>
-      <dgm:spPr/>
-    </dgm:pt>
-    <dgm:pt modelId="{DF825ED0-0132-4F1F-8071-8195DC9ADB0C}" type="pres">
-      <dgm:prSet presAssocID="{14EE3551-C957-401B-BE55-6A86EC1BB91D}" presName="vSp" presStyleCnt="0"/>
-      <dgm:spPr/>
-    </dgm:pt>
-    <dgm:pt modelId="{55D03013-9FF8-4249-A6BF-4565A19718FD}" type="pres">
-      <dgm:prSet presAssocID="{DDC24D32-E1F2-46F3-80DF-2F960C53D79A}" presName="rectComp" presStyleCnt="0"/>
-      <dgm:spPr/>
-    </dgm:pt>
-    <dgm:pt modelId="{A05F9B63-8F7E-4D2E-A54D-E75C443C0853}" type="pres">
-      <dgm:prSet presAssocID="{DDC24D32-E1F2-46F3-80DF-2F960C53D79A}" presName="bgRect" presStyleLbl="bgShp" presStyleIdx="1" presStyleCnt="5"/>
-      <dgm:spPr/>
-    </dgm:pt>
-    <dgm:pt modelId="{7EBFBBFE-C60D-406E-83E5-B82EB744E92B}" type="pres">
-      <dgm:prSet presAssocID="{DDC24D32-E1F2-46F3-80DF-2F960C53D79A}" presName="bgRectTx" presStyleLbl="bgShp" presStyleIdx="1" presStyleCnt="5">
-        <dgm:presLayoutVars>
-          <dgm:bulletEnabled val="1"/>
-        </dgm:presLayoutVars>
-      </dgm:prSet>
-      <dgm:spPr/>
-    </dgm:pt>
-    <dgm:pt modelId="{A16A3AE9-62B1-4C6E-B033-CAE38713C7B2}" type="pres">
-      <dgm:prSet presAssocID="{DDC24D32-E1F2-46F3-80DF-2F960C53D79A}" presName="spComp" presStyleCnt="0"/>
-      <dgm:spPr/>
-    </dgm:pt>
-    <dgm:pt modelId="{F140890D-D112-4225-98E6-D15629373752}" type="pres">
-      <dgm:prSet presAssocID="{DDC24D32-E1F2-46F3-80DF-2F960C53D79A}" presName="vSp" presStyleCnt="0"/>
-      <dgm:spPr/>
-    </dgm:pt>
-    <dgm:pt modelId="{B2FD22FA-F5A0-41A7-BA44-A42BBA8171B3}" type="pres">
-      <dgm:prSet presAssocID="{5886B898-FE96-4569-92A7-C70ED90E8690}" presName="rectComp" presStyleCnt="0"/>
-      <dgm:spPr/>
-    </dgm:pt>
-    <dgm:pt modelId="{7EB3B241-9331-4643-88DB-BC87C28C8D72}" type="pres">
-      <dgm:prSet presAssocID="{5886B898-FE96-4569-92A7-C70ED90E8690}" presName="bgRect" presStyleLbl="bgShp" presStyleIdx="2" presStyleCnt="5"/>
-      <dgm:spPr/>
-    </dgm:pt>
-    <dgm:pt modelId="{A5FC9992-5796-4EB8-B587-70F2EA027AF9}" type="pres">
-      <dgm:prSet presAssocID="{5886B898-FE96-4569-92A7-C70ED90E8690}" presName="bgRectTx" presStyleLbl="bgShp" presStyleIdx="2" presStyleCnt="5">
-        <dgm:presLayoutVars>
-          <dgm:bulletEnabled val="1"/>
-        </dgm:presLayoutVars>
-      </dgm:prSet>
-      <dgm:spPr/>
-    </dgm:pt>
-    <dgm:pt modelId="{EC678649-947B-4B8D-897C-C20C5E8CC648}" type="pres">
-      <dgm:prSet presAssocID="{5886B898-FE96-4569-92A7-C70ED90E8690}" presName="spComp" presStyleCnt="0"/>
-      <dgm:spPr/>
-    </dgm:pt>
-    <dgm:pt modelId="{5886241A-5BD3-4E2F-BDB0-1CEB17FABF00}" type="pres">
-      <dgm:prSet presAssocID="{5886B898-FE96-4569-92A7-C70ED90E8690}" presName="vSp" presStyleCnt="0"/>
-      <dgm:spPr/>
-    </dgm:pt>
-    <dgm:pt modelId="{118C2972-C3E2-4326-90BD-B32B84A05E0D}" type="pres">
-      <dgm:prSet presAssocID="{10967B6A-F6B4-41B1-8A50-906BDDA355FE}" presName="rectComp" presStyleCnt="0"/>
-      <dgm:spPr/>
-    </dgm:pt>
-    <dgm:pt modelId="{0F23B32A-8F9D-4DE7-8AEF-6326095BEE13}" type="pres">
-      <dgm:prSet presAssocID="{10967B6A-F6B4-41B1-8A50-906BDDA355FE}" presName="bgRect" presStyleLbl="bgShp" presStyleIdx="3" presStyleCnt="5"/>
-      <dgm:spPr/>
-    </dgm:pt>
-    <dgm:pt modelId="{9F4B7588-073E-4B16-930E-C9D78B8158D0}" type="pres">
-      <dgm:prSet presAssocID="{10967B6A-F6B4-41B1-8A50-906BDDA355FE}" presName="bgRectTx" presStyleLbl="bgShp" presStyleIdx="3" presStyleCnt="5">
-        <dgm:presLayoutVars>
-          <dgm:bulletEnabled val="1"/>
-        </dgm:presLayoutVars>
-      </dgm:prSet>
-      <dgm:spPr/>
-    </dgm:pt>
-    <dgm:pt modelId="{E18597E1-E199-4FC0-AE9D-943888DF3BB6}" type="pres">
-      <dgm:prSet presAssocID="{10967B6A-F6B4-41B1-8A50-906BDDA355FE}" presName="spComp" presStyleCnt="0"/>
-      <dgm:spPr/>
-    </dgm:pt>
-    <dgm:pt modelId="{894098C8-8BC4-4120-836D-5C43679F8416}" type="pres">
-      <dgm:prSet presAssocID="{10967B6A-F6B4-41B1-8A50-906BDDA355FE}" presName="vSp" presStyleCnt="0"/>
-      <dgm:spPr/>
-    </dgm:pt>
-    <dgm:pt modelId="{7B1BCBD2-4C66-4412-A13F-69CCFC1E4698}" type="pres">
-      <dgm:prSet presAssocID="{DB978D0C-DEB2-49A5-B07B-447C92F3A272}" presName="rectComp" presStyleCnt="0"/>
-      <dgm:spPr/>
-    </dgm:pt>
-    <dgm:pt modelId="{5C0FE9C0-3228-4E31-BF86-3B2D3024054D}" type="pres">
-      <dgm:prSet presAssocID="{DB978D0C-DEB2-49A5-B07B-447C92F3A272}" presName="bgRect" presStyleLbl="bgShp" presStyleIdx="4" presStyleCnt="5"/>
-      <dgm:spPr/>
-    </dgm:pt>
-    <dgm:pt modelId="{D21CAE9E-A406-4FC0-9A2C-80658B35AA75}" type="pres">
-      <dgm:prSet presAssocID="{DB978D0C-DEB2-49A5-B07B-447C92F3A272}" presName="bgRectTx" presStyleLbl="bgShp" presStyleIdx="4" presStyleCnt="5">
-        <dgm:presLayoutVars>
-          <dgm:bulletEnabled val="1"/>
-        </dgm:presLayoutVars>
-      </dgm:prSet>
-      <dgm:spPr/>
-    </dgm:pt>
   </dgm:ptLst>
   <dgm:cxnLst>
     <dgm:cxn modelId="{98596802-B5DE-4359-AE03-89485F2F209A}" type="presOf" srcId="{9F9A03C6-DF23-4F03-BE85-24501C33864F}" destId="{CCC6C37A-BD73-4601-ACB4-EFB7110DA8D5}" srcOrd="0" destOrd="0" presId="urn:microsoft.com/office/officeart/2005/8/layout/hierarchy6"/>
     <dgm:cxn modelId="{472B1210-5581-4B02-8AAB-4080117896E3}" srcId="{B727F245-4F93-4119-B764-B9ADAED66400}" destId="{362B6F71-2C4F-4317-9EC8-498FECBC478E}" srcOrd="0" destOrd="0" parTransId="{EBDB7462-7388-49FC-8946-19AE7418E50A}" sibTransId="{41A990D1-C92D-434F-9C15-CE8D25416D9E}"/>
     <dgm:cxn modelId="{43E3992C-D753-42C4-B090-104984152E42}" type="presOf" srcId="{10DC7534-5866-495E-8BE3-2C3215AD97F7}" destId="{5C9946F2-E2BB-4B54-B854-74F49C310EB2}" srcOrd="0" destOrd="0" presId="urn:microsoft.com/office/officeart/2005/8/layout/hierarchy6"/>
-    <dgm:cxn modelId="{ADCB8761-0808-40BE-B733-BE4B54EE712C}" srcId="{C9423769-D2C8-4F94-846B-7D5A16C918E2}" destId="{5886B898-FE96-4569-92A7-C70ED90E8690}" srcOrd="3" destOrd="0" parTransId="{BCF51EA3-9D11-4B3B-9765-562538CC1898}" sibTransId="{90337B25-0C40-4509-8B1F-540451EBA8BC}"/>
     <dgm:cxn modelId="{08BF7F4D-B4F9-433B-B325-556F123546B0}" srcId="{362B6F71-2C4F-4317-9EC8-498FECBC478E}" destId="{9F9A03C6-DF23-4F03-BE85-24501C33864F}" srcOrd="0" destOrd="0" parTransId="{10DC7534-5866-495E-8BE3-2C3215AD97F7}" sibTransId="{BE9A3851-EA3A-4809-B86F-881DF96A815E}"/>
-    <dgm:cxn modelId="{78F40471-4898-4979-A5D9-A3B741F9655D}" type="presOf" srcId="{DDC24D32-E1F2-46F3-80DF-2F960C53D79A}" destId="{A05F9B63-8F7E-4D2E-A54D-E75C443C0853}" srcOrd="0" destOrd="0" presId="urn:microsoft.com/office/officeart/2005/8/layout/hierarchy6"/>
-    <dgm:cxn modelId="{D4191855-F451-4C6B-A583-BB501F4A10D6}" type="presOf" srcId="{14EE3551-C957-401B-BE55-6A86EC1BB91D}" destId="{74E3C15C-C478-4A6D-9FF3-524873CAFEDE}" srcOrd="1" destOrd="0" presId="urn:microsoft.com/office/officeart/2005/8/layout/hierarchy6"/>
-    <dgm:cxn modelId="{3ECB7B56-F31A-4B09-8DA8-32AC6D851C82}" srcId="{C9423769-D2C8-4F94-846B-7D5A16C918E2}" destId="{DB978D0C-DEB2-49A5-B07B-447C92F3A272}" srcOrd="5" destOrd="0" parTransId="{DEDDF6F0-D6A2-4663-B980-6E85308EB4A3}" sibTransId="{22F9C7F2-A160-409E-8E37-2F6805E56DDE}"/>
     <dgm:cxn modelId="{C8B8717C-4640-42FB-B1FE-32A6D31BCEDE}" type="presOf" srcId="{B727F245-4F93-4119-B764-B9ADAED66400}" destId="{822E8B1A-00BA-4B0F-90B8-18F0336C57F6}" srcOrd="0" destOrd="0" presId="urn:microsoft.com/office/officeart/2005/8/layout/hierarchy6"/>
     <dgm:cxn modelId="{640E1481-51BB-473A-A4B0-C4DCB3DE932E}" type="presOf" srcId="{362B6F71-2C4F-4317-9EC8-498FECBC478E}" destId="{091FB92E-6D71-4B69-A05E-08B79C356B9B}" srcOrd="0" destOrd="0" presId="urn:microsoft.com/office/officeart/2005/8/layout/hierarchy6"/>
-    <dgm:cxn modelId="{A57B8185-98C4-4DAB-9CC8-9496B6AE03FB}" type="presOf" srcId="{5886B898-FE96-4569-92A7-C70ED90E8690}" destId="{7EB3B241-9331-4643-88DB-BC87C28C8D72}" srcOrd="0" destOrd="0" presId="urn:microsoft.com/office/officeart/2005/8/layout/hierarchy6"/>
     <dgm:cxn modelId="{69B7F588-2CB4-4C6F-9666-026BE0B175FA}" srcId="{9F9A03C6-DF23-4F03-BE85-24501C33864F}" destId="{B384ECA6-AD20-4D0D-AA7C-A433FC69E5C2}" srcOrd="0" destOrd="0" parTransId="{20529B5F-1AFA-4853-AFC2-AA3CC05FC23F}" sibTransId="{F4EB0A57-0DA4-49AF-BEA4-499052467AFF}"/>
     <dgm:cxn modelId="{0E51708F-E48F-444E-A80E-AD659DC95D65}" type="presOf" srcId="{C9423769-D2C8-4F94-846B-7D5A16C918E2}" destId="{E25C3278-2C7F-4DF4-954B-3BDD0C883031}" srcOrd="0" destOrd="0" presId="urn:microsoft.com/office/officeart/2005/8/layout/hierarchy6"/>
-    <dgm:cxn modelId="{746AEC99-2E5D-4DDB-9BAA-A1BB99D741C1}" type="presOf" srcId="{10967B6A-F6B4-41B1-8A50-906BDDA355FE}" destId="{9F4B7588-073E-4B16-930E-C9D78B8158D0}" srcOrd="1" destOrd="0" presId="urn:microsoft.com/office/officeart/2005/8/layout/hierarchy6"/>
-    <dgm:cxn modelId="{A9097E9C-3F0B-4E83-B24F-229FC3B60FA5}" type="presOf" srcId="{10967B6A-F6B4-41B1-8A50-906BDDA355FE}" destId="{0F23B32A-8F9D-4DE7-8AEF-6326095BEE13}" srcOrd="0" destOrd="0" presId="urn:microsoft.com/office/officeart/2005/8/layout/hierarchy6"/>
-    <dgm:cxn modelId="{EF0D66A1-0162-47AE-9161-ABD33AE723C0}" type="presOf" srcId="{DDC24D32-E1F2-46F3-80DF-2F960C53D79A}" destId="{7EBFBBFE-C60D-406E-83E5-B82EB744E92B}" srcOrd="1" destOrd="0" presId="urn:microsoft.com/office/officeart/2005/8/layout/hierarchy6"/>
-    <dgm:cxn modelId="{A39B5AA3-4054-46A4-9766-15C062094C74}" type="presOf" srcId="{DB978D0C-DEB2-49A5-B07B-447C92F3A272}" destId="{D21CAE9E-A406-4FC0-9A2C-80658B35AA75}" srcOrd="1" destOrd="0" presId="urn:microsoft.com/office/officeart/2005/8/layout/hierarchy6"/>
-    <dgm:cxn modelId="{94908DAA-0E6B-41D3-B070-1EDB6F1045F3}" type="presOf" srcId="{5886B898-FE96-4569-92A7-C70ED90E8690}" destId="{A5FC9992-5796-4EB8-B587-70F2EA027AF9}" srcOrd="1" destOrd="0" presId="urn:microsoft.com/office/officeart/2005/8/layout/hierarchy6"/>
-    <dgm:cxn modelId="{536684AF-4E3F-4CA8-8D45-C93F02624F6E}" type="presOf" srcId="{14EE3551-C957-401B-BE55-6A86EC1BB91D}" destId="{81D8F765-1C2B-47E8-9104-BC25204BF581}" srcOrd="0" destOrd="0" presId="urn:microsoft.com/office/officeart/2005/8/layout/hierarchy6"/>
     <dgm:cxn modelId="{E91C4EB6-9192-4B3D-91D5-75EC00493A32}" type="presOf" srcId="{CFD67C2E-3F59-4D51-8814-276F3C03B1CF}" destId="{96C48980-A0CD-4E4A-BC68-F2194729EB0A}" srcOrd="0" destOrd="0" presId="urn:microsoft.com/office/officeart/2005/8/layout/hierarchy6"/>
     <dgm:cxn modelId="{EFF78ABE-75F6-411E-8E36-C7AE830E4D44}" srcId="{C9423769-D2C8-4F94-846B-7D5A16C918E2}" destId="{8BD4BDAD-9251-4A3C-A964-FB3942EBF29F}" srcOrd="0" destOrd="0" parTransId="{ED78E4F0-8793-4ED6-8C78-C2E08BE3F2BA}" sibTransId="{1157FA12-ABF6-4921-A224-938A84516575}"/>
     <dgm:cxn modelId="{AEDD7DC0-9F43-4711-87AC-7643E618D19C}" srcId="{8BD4BDAD-9251-4A3C-A964-FB3942EBF29F}" destId="{B727F245-4F93-4119-B764-B9ADAED66400}" srcOrd="0" destOrd="0" parTransId="{CFD67C2E-3F59-4D51-8814-276F3C03B1CF}" sibTransId="{D0B6F159-445B-4E64-AC44-9F6793D8E73F}"/>
     <dgm:cxn modelId="{26B993C9-98AE-45F2-AC1B-D978F16AAFD8}" type="presOf" srcId="{20529B5F-1AFA-4853-AFC2-AA3CC05FC23F}" destId="{ECFCD44B-153F-47BE-AC0B-085156E5B810}" srcOrd="0" destOrd="0" presId="urn:microsoft.com/office/officeart/2005/8/layout/hierarchy6"/>
-    <dgm:cxn modelId="{3376FCCA-36BE-48E1-A636-FC7F1AD7E577}" srcId="{C9423769-D2C8-4F94-846B-7D5A16C918E2}" destId="{14EE3551-C957-401B-BE55-6A86EC1BB91D}" srcOrd="1" destOrd="0" parTransId="{5FE8A452-5873-496E-8782-9717A8384B3D}" sibTransId="{5C65FFE3-0C25-409A-97D3-4C866BF7EA3E}"/>
-    <dgm:cxn modelId="{1389ADCD-9867-405F-960E-79178D289C1F}" type="presOf" srcId="{DB978D0C-DEB2-49A5-B07B-447C92F3A272}" destId="{5C0FE9C0-3228-4E31-BF86-3B2D3024054D}" srcOrd="0" destOrd="0" presId="urn:microsoft.com/office/officeart/2005/8/layout/hierarchy6"/>
     <dgm:cxn modelId="{0BCF22D6-C400-4BCC-84A5-066E14C729B3}" type="presOf" srcId="{B384ECA6-AD20-4D0D-AA7C-A433FC69E5C2}" destId="{05A807ED-5EF2-45D8-AE5B-1CD7418B6077}" srcOrd="0" destOrd="0" presId="urn:microsoft.com/office/officeart/2005/8/layout/hierarchy6"/>
-    <dgm:cxn modelId="{84CC86D6-1625-4404-B1B0-F2A904189D1B}" srcId="{C9423769-D2C8-4F94-846B-7D5A16C918E2}" destId="{DDC24D32-E1F2-46F3-80DF-2F960C53D79A}" srcOrd="2" destOrd="0" parTransId="{67F65B4F-411F-4A54-B17C-3850B3FACCFF}" sibTransId="{6EB03620-DFA9-4125-BF30-A06B825535C2}"/>
     <dgm:cxn modelId="{455DC9E1-80F7-474E-A73D-30D20028DE0D}" type="presOf" srcId="{8BD4BDAD-9251-4A3C-A964-FB3942EBF29F}" destId="{DAEBC06F-7250-4148-A5DF-9E74C1131D38}" srcOrd="0" destOrd="0" presId="urn:microsoft.com/office/officeart/2005/8/layout/hierarchy6"/>
-    <dgm:cxn modelId="{25F2EAEA-B94B-450B-87E4-03701C1C0073}" srcId="{C9423769-D2C8-4F94-846B-7D5A16C918E2}" destId="{10967B6A-F6B4-41B1-8A50-906BDDA355FE}" srcOrd="4" destOrd="0" parTransId="{6881CB8C-D9FB-41B8-8E96-C1198EBB7111}" sibTransId="{135223C0-1F85-4624-841E-5902F6870149}"/>
     <dgm:cxn modelId="{9101C0FE-3495-4991-B4DA-90C1E3A3A09E}" type="presOf" srcId="{EBDB7462-7388-49FC-8946-19AE7418E50A}" destId="{7B6EC39C-6336-4C4E-A454-54B9AA3030FF}" srcOrd="0" destOrd="0" presId="urn:microsoft.com/office/officeart/2005/8/layout/hierarchy6"/>
     <dgm:cxn modelId="{82F5D592-66F3-49C8-B449-863DCE028881}" type="presParOf" srcId="{E25C3278-2C7F-4DF4-954B-3BDD0C883031}" destId="{7939B062-BDC8-483B-909B-4E2A2E729CFE}" srcOrd="0" destOrd="0" presId="urn:microsoft.com/office/officeart/2005/8/layout/hierarchy6"/>
-    <dgm:cxn modelId="{1E74FA72-9F50-4660-8778-74F9833FCF5B}" type="presParOf" srcId="{7939B062-BDC8-483B-909B-4E2A2E729CFE}" destId="{FD490BC2-F399-4417-AE01-4379DD21EB0B}" srcOrd="0" destOrd="0" presId="urn:microsoft.com/office/officeart/2005/8/layout/hierarchy6"/>
-    <dgm:cxn modelId="{DCA94637-5C4E-47C4-A3C0-AA22CB002FE8}" type="presParOf" srcId="{7939B062-BDC8-483B-909B-4E2A2E729CFE}" destId="{CDCBC623-5754-4B61-B38C-15EDDFA5C265}" srcOrd="1" destOrd="0" presId="urn:microsoft.com/office/officeart/2005/8/layout/hierarchy6"/>
+    <dgm:cxn modelId="{DCA94637-5C4E-47C4-A3C0-AA22CB002FE8}" type="presParOf" srcId="{7939B062-BDC8-483B-909B-4E2A2E729CFE}" destId="{CDCBC623-5754-4B61-B38C-15EDDFA5C265}" srcOrd="0" destOrd="0" presId="urn:microsoft.com/office/officeart/2005/8/layout/hierarchy6"/>
     <dgm:cxn modelId="{43089E3A-E60A-4BF6-8E4C-49E234DCE456}" type="presParOf" srcId="{CDCBC623-5754-4B61-B38C-15EDDFA5C265}" destId="{B4106418-510A-4861-925C-4927D39F0893}" srcOrd="0" destOrd="0" presId="urn:microsoft.com/office/officeart/2005/8/layout/hierarchy6"/>
     <dgm:cxn modelId="{8C89053D-6935-419E-BF34-8C03C79B9B1E}" type="presParOf" srcId="{B4106418-510A-4861-925C-4927D39F0893}" destId="{DAEBC06F-7250-4148-A5DF-9E74C1131D38}" srcOrd="0" destOrd="0" presId="urn:microsoft.com/office/officeart/2005/8/layout/hierarchy6"/>
     <dgm:cxn modelId="{1246D743-D436-4704-A5D4-956DF15E3D1B}" type="presParOf" srcId="{B4106418-510A-4861-925C-4927D39F0893}" destId="{E78A51DE-1261-4AFF-B26A-CF8585F9FD21}" srcOrd="1" destOrd="0" presId="urn:microsoft.com/office/officeart/2005/8/layout/hierarchy6"/>
@@ -3036,29 +2739,6 @@
     <dgm:cxn modelId="{E14BB53F-1B73-4F1C-9755-ADAF979AB59E}" type="presParOf" srcId="{766C36B4-47B4-4CBE-91F2-1523D930C047}" destId="{05A807ED-5EF2-45D8-AE5B-1CD7418B6077}" srcOrd="0" destOrd="0" presId="urn:microsoft.com/office/officeart/2005/8/layout/hierarchy6"/>
     <dgm:cxn modelId="{D5C545EC-720D-43FA-836A-95480C6DAB3C}" type="presParOf" srcId="{766C36B4-47B4-4CBE-91F2-1523D930C047}" destId="{396B722E-DC46-4605-AFBB-953715D77021}" srcOrd="1" destOrd="0" presId="urn:microsoft.com/office/officeart/2005/8/layout/hierarchy6"/>
     <dgm:cxn modelId="{63938257-EE03-4A89-8208-97FA13EFC739}" type="presParOf" srcId="{E25C3278-2C7F-4DF4-954B-3BDD0C883031}" destId="{3EDE3D2C-4134-4B81-980B-39AA11B65F76}" srcOrd="1" destOrd="0" presId="urn:microsoft.com/office/officeart/2005/8/layout/hierarchy6"/>
-    <dgm:cxn modelId="{F75FCC67-0A72-48F8-99C0-9BACF2E82846}" type="presParOf" srcId="{3EDE3D2C-4134-4B81-980B-39AA11B65F76}" destId="{9812C23C-142D-4DA7-8BDB-B80C152169B2}" srcOrd="0" destOrd="0" presId="urn:microsoft.com/office/officeart/2005/8/layout/hierarchy6"/>
-    <dgm:cxn modelId="{BD6567C2-D1C1-45B1-B633-46292BA4E66B}" type="presParOf" srcId="{9812C23C-142D-4DA7-8BDB-B80C152169B2}" destId="{81D8F765-1C2B-47E8-9104-BC25204BF581}" srcOrd="0" destOrd="0" presId="urn:microsoft.com/office/officeart/2005/8/layout/hierarchy6"/>
-    <dgm:cxn modelId="{9BB25932-8E13-4881-B786-B9BD4C9B0A9D}" type="presParOf" srcId="{9812C23C-142D-4DA7-8BDB-B80C152169B2}" destId="{74E3C15C-C478-4A6D-9FF3-524873CAFEDE}" srcOrd="1" destOrd="0" presId="urn:microsoft.com/office/officeart/2005/8/layout/hierarchy6"/>
-    <dgm:cxn modelId="{04D55B79-EE00-4ED1-BE42-9CFE944D81A4}" type="presParOf" srcId="{3EDE3D2C-4134-4B81-980B-39AA11B65F76}" destId="{55BEA8F3-DFE0-4F98-99CE-55A83BCBD8B2}" srcOrd="1" destOrd="0" presId="urn:microsoft.com/office/officeart/2005/8/layout/hierarchy6"/>
-    <dgm:cxn modelId="{EABB68E1-6100-44A7-A750-D33C93A33DD2}" type="presParOf" srcId="{55BEA8F3-DFE0-4F98-99CE-55A83BCBD8B2}" destId="{DF825ED0-0132-4F1F-8071-8195DC9ADB0C}" srcOrd="0" destOrd="0" presId="urn:microsoft.com/office/officeart/2005/8/layout/hierarchy6"/>
-    <dgm:cxn modelId="{3847A056-1DCC-41F7-9363-05E6CEADBF97}" type="presParOf" srcId="{3EDE3D2C-4134-4B81-980B-39AA11B65F76}" destId="{55D03013-9FF8-4249-A6BF-4565A19718FD}" srcOrd="2" destOrd="0" presId="urn:microsoft.com/office/officeart/2005/8/layout/hierarchy6"/>
-    <dgm:cxn modelId="{212AF351-93F9-48F7-A502-92C8B36DA502}" type="presParOf" srcId="{55D03013-9FF8-4249-A6BF-4565A19718FD}" destId="{A05F9B63-8F7E-4D2E-A54D-E75C443C0853}" srcOrd="0" destOrd="0" presId="urn:microsoft.com/office/officeart/2005/8/layout/hierarchy6"/>
-    <dgm:cxn modelId="{3F8A5569-20F4-47C5-9843-BA1F322FBFE2}" type="presParOf" srcId="{55D03013-9FF8-4249-A6BF-4565A19718FD}" destId="{7EBFBBFE-C60D-406E-83E5-B82EB744E92B}" srcOrd="1" destOrd="0" presId="urn:microsoft.com/office/officeart/2005/8/layout/hierarchy6"/>
-    <dgm:cxn modelId="{B5DC3CC0-1099-41BD-8296-C90EB8DA0A88}" type="presParOf" srcId="{3EDE3D2C-4134-4B81-980B-39AA11B65F76}" destId="{A16A3AE9-62B1-4C6E-B033-CAE38713C7B2}" srcOrd="3" destOrd="0" presId="urn:microsoft.com/office/officeart/2005/8/layout/hierarchy6"/>
-    <dgm:cxn modelId="{A85F6DAF-1301-41DF-8637-919F6ECF9BFF}" type="presParOf" srcId="{A16A3AE9-62B1-4C6E-B033-CAE38713C7B2}" destId="{F140890D-D112-4225-98E6-D15629373752}" srcOrd="0" destOrd="0" presId="urn:microsoft.com/office/officeart/2005/8/layout/hierarchy6"/>
-    <dgm:cxn modelId="{3E4844E0-A036-470E-8862-3AB1B295F123}" type="presParOf" srcId="{3EDE3D2C-4134-4B81-980B-39AA11B65F76}" destId="{B2FD22FA-F5A0-41A7-BA44-A42BBA8171B3}" srcOrd="4" destOrd="0" presId="urn:microsoft.com/office/officeart/2005/8/layout/hierarchy6"/>
-    <dgm:cxn modelId="{D626ABD6-54F0-4AF6-B650-71785A3DEF79}" type="presParOf" srcId="{B2FD22FA-F5A0-41A7-BA44-A42BBA8171B3}" destId="{7EB3B241-9331-4643-88DB-BC87C28C8D72}" srcOrd="0" destOrd="0" presId="urn:microsoft.com/office/officeart/2005/8/layout/hierarchy6"/>
-    <dgm:cxn modelId="{8147040A-CEBB-4A33-AF50-604EE2448F33}" type="presParOf" srcId="{B2FD22FA-F5A0-41A7-BA44-A42BBA8171B3}" destId="{A5FC9992-5796-4EB8-B587-70F2EA027AF9}" srcOrd="1" destOrd="0" presId="urn:microsoft.com/office/officeart/2005/8/layout/hierarchy6"/>
-    <dgm:cxn modelId="{5D4B29D7-1634-4B7B-BB67-F90A9A4AC356}" type="presParOf" srcId="{3EDE3D2C-4134-4B81-980B-39AA11B65F76}" destId="{EC678649-947B-4B8D-897C-C20C5E8CC648}" srcOrd="5" destOrd="0" presId="urn:microsoft.com/office/officeart/2005/8/layout/hierarchy6"/>
-    <dgm:cxn modelId="{4F4C18D8-9545-4403-A38B-15892384A46F}" type="presParOf" srcId="{EC678649-947B-4B8D-897C-C20C5E8CC648}" destId="{5886241A-5BD3-4E2F-BDB0-1CEB17FABF00}" srcOrd="0" destOrd="0" presId="urn:microsoft.com/office/officeart/2005/8/layout/hierarchy6"/>
-    <dgm:cxn modelId="{875B5061-C762-4F2D-A7FD-607DCB56D32F}" type="presParOf" srcId="{3EDE3D2C-4134-4B81-980B-39AA11B65F76}" destId="{118C2972-C3E2-4326-90BD-B32B84A05E0D}" srcOrd="6" destOrd="0" presId="urn:microsoft.com/office/officeart/2005/8/layout/hierarchy6"/>
-    <dgm:cxn modelId="{97C75561-4D58-4D33-90B6-027036857293}" type="presParOf" srcId="{118C2972-C3E2-4326-90BD-B32B84A05E0D}" destId="{0F23B32A-8F9D-4DE7-8AEF-6326095BEE13}" srcOrd="0" destOrd="0" presId="urn:microsoft.com/office/officeart/2005/8/layout/hierarchy6"/>
-    <dgm:cxn modelId="{B331421B-9652-46F8-BCD7-07085E5D9360}" type="presParOf" srcId="{118C2972-C3E2-4326-90BD-B32B84A05E0D}" destId="{9F4B7588-073E-4B16-930E-C9D78B8158D0}" srcOrd="1" destOrd="0" presId="urn:microsoft.com/office/officeart/2005/8/layout/hierarchy6"/>
-    <dgm:cxn modelId="{78001DAF-B88A-47CE-81C3-5413D89675D6}" type="presParOf" srcId="{3EDE3D2C-4134-4B81-980B-39AA11B65F76}" destId="{E18597E1-E199-4FC0-AE9D-943888DF3BB6}" srcOrd="7" destOrd="0" presId="urn:microsoft.com/office/officeart/2005/8/layout/hierarchy6"/>
-    <dgm:cxn modelId="{A58077CB-D7BF-4604-867B-551B80472C28}" type="presParOf" srcId="{E18597E1-E199-4FC0-AE9D-943888DF3BB6}" destId="{894098C8-8BC4-4120-836D-5C43679F8416}" srcOrd="0" destOrd="0" presId="urn:microsoft.com/office/officeart/2005/8/layout/hierarchy6"/>
-    <dgm:cxn modelId="{675212DB-1662-4D59-A891-82967E582E7A}" type="presParOf" srcId="{3EDE3D2C-4134-4B81-980B-39AA11B65F76}" destId="{7B1BCBD2-4C66-4412-A13F-69CCFC1E4698}" srcOrd="8" destOrd="0" presId="urn:microsoft.com/office/officeart/2005/8/layout/hierarchy6"/>
-    <dgm:cxn modelId="{6BC2310D-352C-4547-BD08-0C21C9808F0C}" type="presParOf" srcId="{7B1BCBD2-4C66-4412-A13F-69CCFC1E4698}" destId="{5C0FE9C0-3228-4E31-BF86-3B2D3024054D}" srcOrd="0" destOrd="0" presId="urn:microsoft.com/office/officeart/2005/8/layout/hierarchy6"/>
-    <dgm:cxn modelId="{99EB428D-3D09-4B2E-9604-B4E012CC9816}" type="presParOf" srcId="{7B1BCBD2-4C66-4412-A13F-69CCFC1E4698}" destId="{D21CAE9E-A406-4FC0-9A2C-80658B35AA75}" srcOrd="1" destOrd="0" presId="urn:microsoft.com/office/officeart/2005/8/layout/hierarchy6"/>
   </dgm:cxnLst>
   <dgm:bg/>
   <dgm:whole/>
@@ -3233,114 +2913,6 @@
         </a:p>
       </dgm:t>
     </dgm:pt>
-    <dgm:pt modelId="{14EE3551-C957-401B-BE55-6A86EC1BB91D}">
-      <dgm:prSet phldrT="[Text]"/>
-      <dgm:spPr/>
-      <dgm:t>
-        <a:bodyPr/>
-        <a:lstStyle/>
-        <a:p>
-          <a:r>
-            <a:rPr lang="en-US" dirty="0"/>
-            <a:t> </a:t>
-          </a:r>
-        </a:p>
-      </dgm:t>
-    </dgm:pt>
-    <dgm:pt modelId="{5FE8A452-5873-496E-8782-9717A8384B3D}" type="parTrans" cxnId="{3376FCCA-36BE-48E1-A636-FC7F1AD7E577}">
-      <dgm:prSet/>
-      <dgm:spPr/>
-      <dgm:t>
-        <a:bodyPr/>
-        <a:lstStyle/>
-        <a:p>
-          <a:endParaRPr lang="en-US"/>
-        </a:p>
-      </dgm:t>
-    </dgm:pt>
-    <dgm:pt modelId="{5C65FFE3-0C25-409A-97D3-4C866BF7EA3E}" type="sibTrans" cxnId="{3376FCCA-36BE-48E1-A636-FC7F1AD7E577}">
-      <dgm:prSet/>
-      <dgm:spPr/>
-      <dgm:t>
-        <a:bodyPr/>
-        <a:lstStyle/>
-        <a:p>
-          <a:endParaRPr lang="en-US"/>
-        </a:p>
-      </dgm:t>
-    </dgm:pt>
-    <dgm:pt modelId="{DDC24D32-E1F2-46F3-80DF-2F960C53D79A}">
-      <dgm:prSet phldrT="[Text]"/>
-      <dgm:spPr/>
-      <dgm:t>
-        <a:bodyPr/>
-        <a:lstStyle/>
-        <a:p>
-          <a:r>
-            <a:rPr lang="en-US" dirty="0"/>
-            <a:t> </a:t>
-          </a:r>
-        </a:p>
-      </dgm:t>
-    </dgm:pt>
-    <dgm:pt modelId="{67F65B4F-411F-4A54-B17C-3850B3FACCFF}" type="parTrans" cxnId="{84CC86D6-1625-4404-B1B0-F2A904189D1B}">
-      <dgm:prSet/>
-      <dgm:spPr/>
-      <dgm:t>
-        <a:bodyPr/>
-        <a:lstStyle/>
-        <a:p>
-          <a:endParaRPr lang="en-US"/>
-        </a:p>
-      </dgm:t>
-    </dgm:pt>
-    <dgm:pt modelId="{6EB03620-DFA9-4125-BF30-A06B825535C2}" type="sibTrans" cxnId="{84CC86D6-1625-4404-B1B0-F2A904189D1B}">
-      <dgm:prSet/>
-      <dgm:spPr/>
-      <dgm:t>
-        <a:bodyPr/>
-        <a:lstStyle/>
-        <a:p>
-          <a:endParaRPr lang="en-US"/>
-        </a:p>
-      </dgm:t>
-    </dgm:pt>
-    <dgm:pt modelId="{5886B898-FE96-4569-92A7-C70ED90E8690}">
-      <dgm:prSet phldrT="[Text]"/>
-      <dgm:spPr/>
-      <dgm:t>
-        <a:bodyPr/>
-        <a:lstStyle/>
-        <a:p>
-          <a:r>
-            <a:rPr lang="en-US" dirty="0"/>
-            <a:t> </a:t>
-          </a:r>
-        </a:p>
-      </dgm:t>
-    </dgm:pt>
-    <dgm:pt modelId="{BCF51EA3-9D11-4B3B-9765-562538CC1898}" type="parTrans" cxnId="{ADCB8761-0808-40BE-B733-BE4B54EE712C}">
-      <dgm:prSet/>
-      <dgm:spPr/>
-      <dgm:t>
-        <a:bodyPr/>
-        <a:lstStyle/>
-        <a:p>
-          <a:endParaRPr lang="en-US"/>
-        </a:p>
-      </dgm:t>
-    </dgm:pt>
-    <dgm:pt modelId="{90337B25-0C40-4509-8B1F-540451EBA8BC}" type="sibTrans" cxnId="{ADCB8761-0808-40BE-B733-BE4B54EE712C}">
-      <dgm:prSet/>
-      <dgm:spPr/>
-      <dgm:t>
-        <a:bodyPr/>
-        <a:lstStyle/>
-        <a:p>
-          <a:endParaRPr lang="en-US"/>
-        </a:p>
-      </dgm:t>
-    </dgm:pt>
     <dgm:pt modelId="{E25C3278-2C7F-4DF4-954B-3BDD0C883031}" type="pres">
       <dgm:prSet presAssocID="{C9423769-D2C8-4F94-846B-7D5A16C918E2}" presName="mainComposite" presStyleCnt="0">
         <dgm:presLayoutVars>
@@ -3355,10 +2927,6 @@
     </dgm:pt>
     <dgm:pt modelId="{7939B062-BDC8-483B-909B-4E2A2E729CFE}" type="pres">
       <dgm:prSet presAssocID="{C9423769-D2C8-4F94-846B-7D5A16C918E2}" presName="hierFlow" presStyleCnt="0"/>
-      <dgm:spPr/>
-    </dgm:pt>
-    <dgm:pt modelId="{FD490BC2-F399-4417-AE01-4379DD21EB0B}" type="pres">
-      <dgm:prSet presAssocID="{C9423769-D2C8-4F94-846B-7D5A16C918E2}" presName="firstBuf" presStyleCnt="0"/>
       <dgm:spPr/>
     </dgm:pt>
     <dgm:pt modelId="{CDCBC623-5754-4B61-B38C-15EDDFA5C265}" type="pres">
@@ -3439,96 +3007,22 @@
       <dgm:prSet presAssocID="{C9423769-D2C8-4F94-846B-7D5A16C918E2}" presName="bgShapesFlow" presStyleCnt="0"/>
       <dgm:spPr/>
     </dgm:pt>
-    <dgm:pt modelId="{9812C23C-142D-4DA7-8BDB-B80C152169B2}" type="pres">
-      <dgm:prSet presAssocID="{14EE3551-C957-401B-BE55-6A86EC1BB91D}" presName="rectComp" presStyleCnt="0"/>
-      <dgm:spPr/>
-    </dgm:pt>
-    <dgm:pt modelId="{81D8F765-1C2B-47E8-9104-BC25204BF581}" type="pres">
-      <dgm:prSet presAssocID="{14EE3551-C957-401B-BE55-6A86EC1BB91D}" presName="bgRect" presStyleLbl="bgShp" presStyleIdx="0" presStyleCnt="3"/>
-      <dgm:spPr/>
-    </dgm:pt>
-    <dgm:pt modelId="{74E3C15C-C478-4A6D-9FF3-524873CAFEDE}" type="pres">
-      <dgm:prSet presAssocID="{14EE3551-C957-401B-BE55-6A86EC1BB91D}" presName="bgRectTx" presStyleLbl="bgShp" presStyleIdx="0" presStyleCnt="3">
-        <dgm:presLayoutVars>
-          <dgm:bulletEnabled val="1"/>
-        </dgm:presLayoutVars>
-      </dgm:prSet>
-      <dgm:spPr/>
-    </dgm:pt>
-    <dgm:pt modelId="{55BEA8F3-DFE0-4F98-99CE-55A83BCBD8B2}" type="pres">
-      <dgm:prSet presAssocID="{14EE3551-C957-401B-BE55-6A86EC1BB91D}" presName="spComp" presStyleCnt="0"/>
-      <dgm:spPr/>
-    </dgm:pt>
-    <dgm:pt modelId="{DF825ED0-0132-4F1F-8071-8195DC9ADB0C}" type="pres">
-      <dgm:prSet presAssocID="{14EE3551-C957-401B-BE55-6A86EC1BB91D}" presName="vSp" presStyleCnt="0"/>
-      <dgm:spPr/>
-    </dgm:pt>
-    <dgm:pt modelId="{55D03013-9FF8-4249-A6BF-4565A19718FD}" type="pres">
-      <dgm:prSet presAssocID="{DDC24D32-E1F2-46F3-80DF-2F960C53D79A}" presName="rectComp" presStyleCnt="0"/>
-      <dgm:spPr/>
-    </dgm:pt>
-    <dgm:pt modelId="{A05F9B63-8F7E-4D2E-A54D-E75C443C0853}" type="pres">
-      <dgm:prSet presAssocID="{DDC24D32-E1F2-46F3-80DF-2F960C53D79A}" presName="bgRect" presStyleLbl="bgShp" presStyleIdx="1" presStyleCnt="3" custLinFactNeighborX="-3313"/>
-      <dgm:spPr/>
-    </dgm:pt>
-    <dgm:pt modelId="{7EBFBBFE-C60D-406E-83E5-B82EB744E92B}" type="pres">
-      <dgm:prSet presAssocID="{DDC24D32-E1F2-46F3-80DF-2F960C53D79A}" presName="bgRectTx" presStyleLbl="bgShp" presStyleIdx="1" presStyleCnt="3">
-        <dgm:presLayoutVars>
-          <dgm:bulletEnabled val="1"/>
-        </dgm:presLayoutVars>
-      </dgm:prSet>
-      <dgm:spPr/>
-    </dgm:pt>
-    <dgm:pt modelId="{A16A3AE9-62B1-4C6E-B033-CAE38713C7B2}" type="pres">
-      <dgm:prSet presAssocID="{DDC24D32-E1F2-46F3-80DF-2F960C53D79A}" presName="spComp" presStyleCnt="0"/>
-      <dgm:spPr/>
-    </dgm:pt>
-    <dgm:pt modelId="{F140890D-D112-4225-98E6-D15629373752}" type="pres">
-      <dgm:prSet presAssocID="{DDC24D32-E1F2-46F3-80DF-2F960C53D79A}" presName="vSp" presStyleCnt="0"/>
-      <dgm:spPr/>
-    </dgm:pt>
-    <dgm:pt modelId="{B2FD22FA-F5A0-41A7-BA44-A42BBA8171B3}" type="pres">
-      <dgm:prSet presAssocID="{5886B898-FE96-4569-92A7-C70ED90E8690}" presName="rectComp" presStyleCnt="0"/>
-      <dgm:spPr/>
-    </dgm:pt>
-    <dgm:pt modelId="{7EB3B241-9331-4643-88DB-BC87C28C8D72}" type="pres">
-      <dgm:prSet presAssocID="{5886B898-FE96-4569-92A7-C70ED90E8690}" presName="bgRect" presStyleLbl="bgShp" presStyleIdx="2" presStyleCnt="3" custLinFactNeighborX="-3406" custLinFactNeighborY="4448"/>
-      <dgm:spPr/>
-    </dgm:pt>
-    <dgm:pt modelId="{A5FC9992-5796-4EB8-B587-70F2EA027AF9}" type="pres">
-      <dgm:prSet presAssocID="{5886B898-FE96-4569-92A7-C70ED90E8690}" presName="bgRectTx" presStyleLbl="bgShp" presStyleIdx="2" presStyleCnt="3">
-        <dgm:presLayoutVars>
-          <dgm:bulletEnabled val="1"/>
-        </dgm:presLayoutVars>
-      </dgm:prSet>
-      <dgm:spPr/>
-    </dgm:pt>
   </dgm:ptLst>
   <dgm:cxnLst>
     <dgm:cxn modelId="{11B38B1A-072E-4113-9F34-385B80B3C0CA}" type="presOf" srcId="{DD705CB8-984B-4881-A1AB-069427C93122}" destId="{6060F710-9C30-484B-BCA4-695BA2D8448A}" srcOrd="0" destOrd="0" presId="urn:microsoft.com/office/officeart/2005/8/layout/hierarchy6"/>
     <dgm:cxn modelId="{0C866A40-BBBF-4ACE-9B49-ACE669E682FE}" srcId="{8BD4BDAD-9251-4A3C-A964-FB3942EBF29F}" destId="{2BA38ACC-78CB-4052-AC7D-83344B3F76AC}" srcOrd="1" destOrd="0" parTransId="{D4606117-042D-4855-A66D-D4CA4005F926}" sibTransId="{CA76A408-696D-4B24-A69F-45F76A30BC51}"/>
-    <dgm:cxn modelId="{ADCB8761-0808-40BE-B733-BE4B54EE712C}" srcId="{C9423769-D2C8-4F94-846B-7D5A16C918E2}" destId="{5886B898-FE96-4569-92A7-C70ED90E8690}" srcOrd="3" destOrd="0" parTransId="{BCF51EA3-9D11-4B3B-9765-562538CC1898}" sibTransId="{90337B25-0C40-4509-8B1F-540451EBA8BC}"/>
     <dgm:cxn modelId="{5C2D6A6B-1854-41D7-B556-53D5A5504FB3}" srcId="{2BA38ACC-78CB-4052-AC7D-83344B3F76AC}" destId="{90AEFB84-1338-4240-A3EC-68F3C92149EC}" srcOrd="0" destOrd="0" parTransId="{DD705CB8-984B-4881-A1AB-069427C93122}" sibTransId="{5E4A4361-7AC6-46D4-AF99-B3531D6816A5}"/>
-    <dgm:cxn modelId="{78F40471-4898-4979-A5D9-A3B741F9655D}" type="presOf" srcId="{DDC24D32-E1F2-46F3-80DF-2F960C53D79A}" destId="{A05F9B63-8F7E-4D2E-A54D-E75C443C0853}" srcOrd="0" destOrd="0" presId="urn:microsoft.com/office/officeart/2005/8/layout/hierarchy6"/>
-    <dgm:cxn modelId="{D4191855-F451-4C6B-A583-BB501F4A10D6}" type="presOf" srcId="{14EE3551-C957-401B-BE55-6A86EC1BB91D}" destId="{74E3C15C-C478-4A6D-9FF3-524873CAFEDE}" srcOrd="1" destOrd="0" presId="urn:microsoft.com/office/officeart/2005/8/layout/hierarchy6"/>
     <dgm:cxn modelId="{C8B8717C-4640-42FB-B1FE-32A6D31BCEDE}" type="presOf" srcId="{B727F245-4F93-4119-B764-B9ADAED66400}" destId="{822E8B1A-00BA-4B0F-90B8-18F0336C57F6}" srcOrd="0" destOrd="0" presId="urn:microsoft.com/office/officeart/2005/8/layout/hierarchy6"/>
     <dgm:cxn modelId="{4E60407E-527E-4C31-A32C-5D4146D60E8F}" type="presOf" srcId="{2BA38ACC-78CB-4052-AC7D-83344B3F76AC}" destId="{20DD1262-3461-405D-957B-563CCED4640C}" srcOrd="0" destOrd="0" presId="urn:microsoft.com/office/officeart/2005/8/layout/hierarchy6"/>
-    <dgm:cxn modelId="{A57B8185-98C4-4DAB-9CC8-9496B6AE03FB}" type="presOf" srcId="{5886B898-FE96-4569-92A7-C70ED90E8690}" destId="{7EB3B241-9331-4643-88DB-BC87C28C8D72}" srcOrd="0" destOrd="0" presId="urn:microsoft.com/office/officeart/2005/8/layout/hierarchy6"/>
     <dgm:cxn modelId="{0E51708F-E48F-444E-A80E-AD659DC95D65}" type="presOf" srcId="{C9423769-D2C8-4F94-846B-7D5A16C918E2}" destId="{E25C3278-2C7F-4DF4-954B-3BDD0C883031}" srcOrd="0" destOrd="0" presId="urn:microsoft.com/office/officeart/2005/8/layout/hierarchy6"/>
     <dgm:cxn modelId="{BBE9DF9D-1349-48ED-9BAA-DC771530C72E}" type="presOf" srcId="{D4606117-042D-4855-A66D-D4CA4005F926}" destId="{667A4CE5-1C37-4F92-B905-3AD81A3D9953}" srcOrd="0" destOrd="0" presId="urn:microsoft.com/office/officeart/2005/8/layout/hierarchy6"/>
-    <dgm:cxn modelId="{EF0D66A1-0162-47AE-9161-ABD33AE723C0}" type="presOf" srcId="{DDC24D32-E1F2-46F3-80DF-2F960C53D79A}" destId="{7EBFBBFE-C60D-406E-83E5-B82EB744E92B}" srcOrd="1" destOrd="0" presId="urn:microsoft.com/office/officeart/2005/8/layout/hierarchy6"/>
-    <dgm:cxn modelId="{94908DAA-0E6B-41D3-B070-1EDB6F1045F3}" type="presOf" srcId="{5886B898-FE96-4569-92A7-C70ED90E8690}" destId="{A5FC9992-5796-4EB8-B587-70F2EA027AF9}" srcOrd="1" destOrd="0" presId="urn:microsoft.com/office/officeart/2005/8/layout/hierarchy6"/>
-    <dgm:cxn modelId="{536684AF-4E3F-4CA8-8D45-C93F02624F6E}" type="presOf" srcId="{14EE3551-C957-401B-BE55-6A86EC1BB91D}" destId="{81D8F765-1C2B-47E8-9104-BC25204BF581}" srcOrd="0" destOrd="0" presId="urn:microsoft.com/office/officeart/2005/8/layout/hierarchy6"/>
     <dgm:cxn modelId="{E91C4EB6-9192-4B3D-91D5-75EC00493A32}" type="presOf" srcId="{CFD67C2E-3F59-4D51-8814-276F3C03B1CF}" destId="{96C48980-A0CD-4E4A-BC68-F2194729EB0A}" srcOrd="0" destOrd="0" presId="urn:microsoft.com/office/officeart/2005/8/layout/hierarchy6"/>
     <dgm:cxn modelId="{EFF78ABE-75F6-411E-8E36-C7AE830E4D44}" srcId="{C9423769-D2C8-4F94-846B-7D5A16C918E2}" destId="{8BD4BDAD-9251-4A3C-A964-FB3942EBF29F}" srcOrd="0" destOrd="0" parTransId="{ED78E4F0-8793-4ED6-8C78-C2E08BE3F2BA}" sibTransId="{1157FA12-ABF6-4921-A224-938A84516575}"/>
     <dgm:cxn modelId="{AEDD7DC0-9F43-4711-87AC-7643E618D19C}" srcId="{8BD4BDAD-9251-4A3C-A964-FB3942EBF29F}" destId="{B727F245-4F93-4119-B764-B9ADAED66400}" srcOrd="0" destOrd="0" parTransId="{CFD67C2E-3F59-4D51-8814-276F3C03B1CF}" sibTransId="{D0B6F159-445B-4E64-AC44-9F6793D8E73F}"/>
-    <dgm:cxn modelId="{3376FCCA-36BE-48E1-A636-FC7F1AD7E577}" srcId="{C9423769-D2C8-4F94-846B-7D5A16C918E2}" destId="{14EE3551-C957-401B-BE55-6A86EC1BB91D}" srcOrd="1" destOrd="0" parTransId="{5FE8A452-5873-496E-8782-9717A8384B3D}" sibTransId="{5C65FFE3-0C25-409A-97D3-4C866BF7EA3E}"/>
-    <dgm:cxn modelId="{84CC86D6-1625-4404-B1B0-F2A904189D1B}" srcId="{C9423769-D2C8-4F94-846B-7D5A16C918E2}" destId="{DDC24D32-E1F2-46F3-80DF-2F960C53D79A}" srcOrd="2" destOrd="0" parTransId="{67F65B4F-411F-4A54-B17C-3850B3FACCFF}" sibTransId="{6EB03620-DFA9-4125-BF30-A06B825535C2}"/>
     <dgm:cxn modelId="{FF02C9D7-CA25-483C-B251-0B696AC098BB}" type="presOf" srcId="{90AEFB84-1338-4240-A3EC-68F3C92149EC}" destId="{1361E14E-42E7-4127-80B2-1E72A97A6BD5}" srcOrd="0" destOrd="0" presId="urn:microsoft.com/office/officeart/2005/8/layout/hierarchy6"/>
     <dgm:cxn modelId="{455DC9E1-80F7-474E-A73D-30D20028DE0D}" type="presOf" srcId="{8BD4BDAD-9251-4A3C-A964-FB3942EBF29F}" destId="{DAEBC06F-7250-4148-A5DF-9E74C1131D38}" srcOrd="0" destOrd="0" presId="urn:microsoft.com/office/officeart/2005/8/layout/hierarchy6"/>
     <dgm:cxn modelId="{82F5D592-66F3-49C8-B449-863DCE028881}" type="presParOf" srcId="{E25C3278-2C7F-4DF4-954B-3BDD0C883031}" destId="{7939B062-BDC8-483B-909B-4E2A2E729CFE}" srcOrd="0" destOrd="0" presId="urn:microsoft.com/office/officeart/2005/8/layout/hierarchy6"/>
-    <dgm:cxn modelId="{1E74FA72-9F50-4660-8778-74F9833FCF5B}" type="presParOf" srcId="{7939B062-BDC8-483B-909B-4E2A2E729CFE}" destId="{FD490BC2-F399-4417-AE01-4379DD21EB0B}" srcOrd="0" destOrd="0" presId="urn:microsoft.com/office/officeart/2005/8/layout/hierarchy6"/>
-    <dgm:cxn modelId="{DCA94637-5C4E-47C4-A3C0-AA22CB002FE8}" type="presParOf" srcId="{7939B062-BDC8-483B-909B-4E2A2E729CFE}" destId="{CDCBC623-5754-4B61-B38C-15EDDFA5C265}" srcOrd="1" destOrd="0" presId="urn:microsoft.com/office/officeart/2005/8/layout/hierarchy6"/>
+    <dgm:cxn modelId="{DCA94637-5C4E-47C4-A3C0-AA22CB002FE8}" type="presParOf" srcId="{7939B062-BDC8-483B-909B-4E2A2E729CFE}" destId="{CDCBC623-5754-4B61-B38C-15EDDFA5C265}" srcOrd="0" destOrd="0" presId="urn:microsoft.com/office/officeart/2005/8/layout/hierarchy6"/>
     <dgm:cxn modelId="{43089E3A-E60A-4BF6-8E4C-49E234DCE456}" type="presParOf" srcId="{CDCBC623-5754-4B61-B38C-15EDDFA5C265}" destId="{B4106418-510A-4861-925C-4927D39F0893}" srcOrd="0" destOrd="0" presId="urn:microsoft.com/office/officeart/2005/8/layout/hierarchy6"/>
     <dgm:cxn modelId="{8C89053D-6935-419E-BF34-8C03C79B9B1E}" type="presParOf" srcId="{B4106418-510A-4861-925C-4927D39F0893}" destId="{DAEBC06F-7250-4148-A5DF-9E74C1131D38}" srcOrd="0" destOrd="0" presId="urn:microsoft.com/office/officeart/2005/8/layout/hierarchy6"/>
     <dgm:cxn modelId="{1246D743-D436-4704-A5D4-956DF15E3D1B}" type="presParOf" srcId="{B4106418-510A-4861-925C-4927D39F0893}" destId="{E78A51DE-1261-4AFF-B26A-CF8585F9FD21}" srcOrd="1" destOrd="0" presId="urn:microsoft.com/office/officeart/2005/8/layout/hierarchy6"/>
@@ -3545,19 +3039,6 @@
     <dgm:cxn modelId="{124DCD26-4C95-43D7-BD93-7F4F16ACA6F8}" type="presParOf" srcId="{2F6700AB-7930-4D7B-B148-B05114B3AC86}" destId="{1361E14E-42E7-4127-80B2-1E72A97A6BD5}" srcOrd="0" destOrd="0" presId="urn:microsoft.com/office/officeart/2005/8/layout/hierarchy6"/>
     <dgm:cxn modelId="{A8C7CB14-84E9-4BF0-9A28-966AB781471D}" type="presParOf" srcId="{2F6700AB-7930-4D7B-B148-B05114B3AC86}" destId="{7DF88357-E2C6-4A5B-AF28-366F3C303A7A}" srcOrd="1" destOrd="0" presId="urn:microsoft.com/office/officeart/2005/8/layout/hierarchy6"/>
     <dgm:cxn modelId="{63938257-EE03-4A89-8208-97FA13EFC739}" type="presParOf" srcId="{E25C3278-2C7F-4DF4-954B-3BDD0C883031}" destId="{3EDE3D2C-4134-4B81-980B-39AA11B65F76}" srcOrd="1" destOrd="0" presId="urn:microsoft.com/office/officeart/2005/8/layout/hierarchy6"/>
-    <dgm:cxn modelId="{F75FCC67-0A72-48F8-99C0-9BACF2E82846}" type="presParOf" srcId="{3EDE3D2C-4134-4B81-980B-39AA11B65F76}" destId="{9812C23C-142D-4DA7-8BDB-B80C152169B2}" srcOrd="0" destOrd="0" presId="urn:microsoft.com/office/officeart/2005/8/layout/hierarchy6"/>
-    <dgm:cxn modelId="{BD6567C2-D1C1-45B1-B633-46292BA4E66B}" type="presParOf" srcId="{9812C23C-142D-4DA7-8BDB-B80C152169B2}" destId="{81D8F765-1C2B-47E8-9104-BC25204BF581}" srcOrd="0" destOrd="0" presId="urn:microsoft.com/office/officeart/2005/8/layout/hierarchy6"/>
-    <dgm:cxn modelId="{9BB25932-8E13-4881-B786-B9BD4C9B0A9D}" type="presParOf" srcId="{9812C23C-142D-4DA7-8BDB-B80C152169B2}" destId="{74E3C15C-C478-4A6D-9FF3-524873CAFEDE}" srcOrd="1" destOrd="0" presId="urn:microsoft.com/office/officeart/2005/8/layout/hierarchy6"/>
-    <dgm:cxn modelId="{04D55B79-EE00-4ED1-BE42-9CFE944D81A4}" type="presParOf" srcId="{3EDE3D2C-4134-4B81-980B-39AA11B65F76}" destId="{55BEA8F3-DFE0-4F98-99CE-55A83BCBD8B2}" srcOrd="1" destOrd="0" presId="urn:microsoft.com/office/officeart/2005/8/layout/hierarchy6"/>
-    <dgm:cxn modelId="{EABB68E1-6100-44A7-A750-D33C93A33DD2}" type="presParOf" srcId="{55BEA8F3-DFE0-4F98-99CE-55A83BCBD8B2}" destId="{DF825ED0-0132-4F1F-8071-8195DC9ADB0C}" srcOrd="0" destOrd="0" presId="urn:microsoft.com/office/officeart/2005/8/layout/hierarchy6"/>
-    <dgm:cxn modelId="{3847A056-1DCC-41F7-9363-05E6CEADBF97}" type="presParOf" srcId="{3EDE3D2C-4134-4B81-980B-39AA11B65F76}" destId="{55D03013-9FF8-4249-A6BF-4565A19718FD}" srcOrd="2" destOrd="0" presId="urn:microsoft.com/office/officeart/2005/8/layout/hierarchy6"/>
-    <dgm:cxn modelId="{212AF351-93F9-48F7-A502-92C8B36DA502}" type="presParOf" srcId="{55D03013-9FF8-4249-A6BF-4565A19718FD}" destId="{A05F9B63-8F7E-4D2E-A54D-E75C443C0853}" srcOrd="0" destOrd="0" presId="urn:microsoft.com/office/officeart/2005/8/layout/hierarchy6"/>
-    <dgm:cxn modelId="{3F8A5569-20F4-47C5-9843-BA1F322FBFE2}" type="presParOf" srcId="{55D03013-9FF8-4249-A6BF-4565A19718FD}" destId="{7EBFBBFE-C60D-406E-83E5-B82EB744E92B}" srcOrd="1" destOrd="0" presId="urn:microsoft.com/office/officeart/2005/8/layout/hierarchy6"/>
-    <dgm:cxn modelId="{B5DC3CC0-1099-41BD-8296-C90EB8DA0A88}" type="presParOf" srcId="{3EDE3D2C-4134-4B81-980B-39AA11B65F76}" destId="{A16A3AE9-62B1-4C6E-B033-CAE38713C7B2}" srcOrd="3" destOrd="0" presId="urn:microsoft.com/office/officeart/2005/8/layout/hierarchy6"/>
-    <dgm:cxn modelId="{A85F6DAF-1301-41DF-8637-919F6ECF9BFF}" type="presParOf" srcId="{A16A3AE9-62B1-4C6E-B033-CAE38713C7B2}" destId="{F140890D-D112-4225-98E6-D15629373752}" srcOrd="0" destOrd="0" presId="urn:microsoft.com/office/officeart/2005/8/layout/hierarchy6"/>
-    <dgm:cxn modelId="{3E4844E0-A036-470E-8862-3AB1B295F123}" type="presParOf" srcId="{3EDE3D2C-4134-4B81-980B-39AA11B65F76}" destId="{B2FD22FA-F5A0-41A7-BA44-A42BBA8171B3}" srcOrd="4" destOrd="0" presId="urn:microsoft.com/office/officeart/2005/8/layout/hierarchy6"/>
-    <dgm:cxn modelId="{D626ABD6-54F0-4AF6-B650-71785A3DEF79}" type="presParOf" srcId="{B2FD22FA-F5A0-41A7-BA44-A42BBA8171B3}" destId="{7EB3B241-9331-4643-88DB-BC87C28C8D72}" srcOrd="0" destOrd="0" presId="urn:microsoft.com/office/officeart/2005/8/layout/hierarchy6"/>
-    <dgm:cxn modelId="{8147040A-CEBB-4A33-AF50-604EE2448F33}" type="presParOf" srcId="{B2FD22FA-F5A0-41A7-BA44-A42BBA8171B3}" destId="{A5FC9992-5796-4EB8-B587-70F2EA027AF9}" srcOrd="1" destOrd="0" presId="urn:microsoft.com/office/officeart/2005/8/layout/hierarchy6"/>
   </dgm:cxnLst>
   <dgm:bg/>
   <dgm:whole/>
@@ -3659,105 +3140,6 @@
         </a:p>
       </dgm:t>
     </dgm:pt>
-    <dgm:pt modelId="{14EE3551-C957-401B-BE55-6A86EC1BB91D}">
-      <dgm:prSet phldrT="[Text]" phldr="1"/>
-      <dgm:spPr/>
-      <dgm:t>
-        <a:bodyPr/>
-        <a:lstStyle/>
-        <a:p>
-          <a:endParaRPr lang="en-US" dirty="0"/>
-        </a:p>
-      </dgm:t>
-    </dgm:pt>
-    <dgm:pt modelId="{5FE8A452-5873-496E-8782-9717A8384B3D}" type="parTrans" cxnId="{3376FCCA-36BE-48E1-A636-FC7F1AD7E577}">
-      <dgm:prSet/>
-      <dgm:spPr/>
-      <dgm:t>
-        <a:bodyPr/>
-        <a:lstStyle/>
-        <a:p>
-          <a:endParaRPr lang="en-US"/>
-        </a:p>
-      </dgm:t>
-    </dgm:pt>
-    <dgm:pt modelId="{5C65FFE3-0C25-409A-97D3-4C866BF7EA3E}" type="sibTrans" cxnId="{3376FCCA-36BE-48E1-A636-FC7F1AD7E577}">
-      <dgm:prSet/>
-      <dgm:spPr/>
-      <dgm:t>
-        <a:bodyPr/>
-        <a:lstStyle/>
-        <a:p>
-          <a:endParaRPr lang="en-US"/>
-        </a:p>
-      </dgm:t>
-    </dgm:pt>
-    <dgm:pt modelId="{DDC24D32-E1F2-46F3-80DF-2F960C53D79A}">
-      <dgm:prSet phldrT="[Text]" phldr="1"/>
-      <dgm:spPr/>
-      <dgm:t>
-        <a:bodyPr/>
-        <a:lstStyle/>
-        <a:p>
-          <a:endParaRPr lang="en-US" dirty="0"/>
-        </a:p>
-      </dgm:t>
-    </dgm:pt>
-    <dgm:pt modelId="{67F65B4F-411F-4A54-B17C-3850B3FACCFF}" type="parTrans" cxnId="{84CC86D6-1625-4404-B1B0-F2A904189D1B}">
-      <dgm:prSet/>
-      <dgm:spPr/>
-      <dgm:t>
-        <a:bodyPr/>
-        <a:lstStyle/>
-        <a:p>
-          <a:endParaRPr lang="en-US"/>
-        </a:p>
-      </dgm:t>
-    </dgm:pt>
-    <dgm:pt modelId="{6EB03620-DFA9-4125-BF30-A06B825535C2}" type="sibTrans" cxnId="{84CC86D6-1625-4404-B1B0-F2A904189D1B}">
-      <dgm:prSet/>
-      <dgm:spPr/>
-      <dgm:t>
-        <a:bodyPr/>
-        <a:lstStyle/>
-        <a:p>
-          <a:endParaRPr lang="en-US"/>
-        </a:p>
-      </dgm:t>
-    </dgm:pt>
-    <dgm:pt modelId="{5886B898-FE96-4569-92A7-C70ED90E8690}">
-      <dgm:prSet phldrT="[Text]" phldr="1"/>
-      <dgm:spPr/>
-      <dgm:t>
-        <a:bodyPr/>
-        <a:lstStyle/>
-        <a:p>
-          <a:endParaRPr lang="en-US" dirty="0"/>
-        </a:p>
-      </dgm:t>
-    </dgm:pt>
-    <dgm:pt modelId="{BCF51EA3-9D11-4B3B-9765-562538CC1898}" type="parTrans" cxnId="{ADCB8761-0808-40BE-B733-BE4B54EE712C}">
-      <dgm:prSet/>
-      <dgm:spPr/>
-      <dgm:t>
-        <a:bodyPr/>
-        <a:lstStyle/>
-        <a:p>
-          <a:endParaRPr lang="en-US"/>
-        </a:p>
-      </dgm:t>
-    </dgm:pt>
-    <dgm:pt modelId="{90337B25-0C40-4509-8B1F-540451EBA8BC}" type="sibTrans" cxnId="{ADCB8761-0808-40BE-B733-BE4B54EE712C}">
-      <dgm:prSet/>
-      <dgm:spPr/>
-      <dgm:t>
-        <a:bodyPr/>
-        <a:lstStyle/>
-        <a:p>
-          <a:endParaRPr lang="en-US"/>
-        </a:p>
-      </dgm:t>
-    </dgm:pt>
     <dgm:pt modelId="{B384ECA6-AD20-4D0D-AA7C-A433FC69E5C2}">
       <dgm:prSet phldrT="[Text]"/>
       <dgm:spPr/>
@@ -3808,10 +3190,6 @@
     </dgm:pt>
     <dgm:pt modelId="{7939B062-BDC8-483B-909B-4E2A2E729CFE}" type="pres">
       <dgm:prSet presAssocID="{C9423769-D2C8-4F94-846B-7D5A16C918E2}" presName="hierFlow" presStyleCnt="0"/>
-      <dgm:spPr/>
-    </dgm:pt>
-    <dgm:pt modelId="{FD490BC2-F399-4417-AE01-4379DD21EB0B}" type="pres">
-      <dgm:prSet presAssocID="{C9423769-D2C8-4F94-846B-7D5A16C918E2}" presName="firstBuf" presStyleCnt="0"/>
       <dgm:spPr/>
     </dgm:pt>
     <dgm:pt modelId="{CDCBC623-5754-4B61-B38C-15EDDFA5C265}" type="pres">
@@ -3876,93 +3254,19 @@
       <dgm:prSet presAssocID="{C9423769-D2C8-4F94-846B-7D5A16C918E2}" presName="bgShapesFlow" presStyleCnt="0"/>
       <dgm:spPr/>
     </dgm:pt>
-    <dgm:pt modelId="{9812C23C-142D-4DA7-8BDB-B80C152169B2}" type="pres">
-      <dgm:prSet presAssocID="{14EE3551-C957-401B-BE55-6A86EC1BB91D}" presName="rectComp" presStyleCnt="0"/>
-      <dgm:spPr/>
-    </dgm:pt>
-    <dgm:pt modelId="{81D8F765-1C2B-47E8-9104-BC25204BF581}" type="pres">
-      <dgm:prSet presAssocID="{14EE3551-C957-401B-BE55-6A86EC1BB91D}" presName="bgRect" presStyleLbl="bgShp" presStyleIdx="0" presStyleCnt="3" custLinFactNeighborX="-7709" custLinFactNeighborY="-29061"/>
-      <dgm:spPr/>
-    </dgm:pt>
-    <dgm:pt modelId="{74E3C15C-C478-4A6D-9FF3-524873CAFEDE}" type="pres">
-      <dgm:prSet presAssocID="{14EE3551-C957-401B-BE55-6A86EC1BB91D}" presName="bgRectTx" presStyleLbl="bgShp" presStyleIdx="0" presStyleCnt="3">
-        <dgm:presLayoutVars>
-          <dgm:bulletEnabled val="1"/>
-        </dgm:presLayoutVars>
-      </dgm:prSet>
-      <dgm:spPr/>
-    </dgm:pt>
-    <dgm:pt modelId="{55BEA8F3-DFE0-4F98-99CE-55A83BCBD8B2}" type="pres">
-      <dgm:prSet presAssocID="{14EE3551-C957-401B-BE55-6A86EC1BB91D}" presName="spComp" presStyleCnt="0"/>
-      <dgm:spPr/>
-    </dgm:pt>
-    <dgm:pt modelId="{DF825ED0-0132-4F1F-8071-8195DC9ADB0C}" type="pres">
-      <dgm:prSet presAssocID="{14EE3551-C957-401B-BE55-6A86EC1BB91D}" presName="vSp" presStyleCnt="0"/>
-      <dgm:spPr/>
-    </dgm:pt>
-    <dgm:pt modelId="{55D03013-9FF8-4249-A6BF-4565A19718FD}" type="pres">
-      <dgm:prSet presAssocID="{DDC24D32-E1F2-46F3-80DF-2F960C53D79A}" presName="rectComp" presStyleCnt="0"/>
-      <dgm:spPr/>
-    </dgm:pt>
-    <dgm:pt modelId="{A05F9B63-8F7E-4D2E-A54D-E75C443C0853}" type="pres">
-      <dgm:prSet presAssocID="{DDC24D32-E1F2-46F3-80DF-2F960C53D79A}" presName="bgRect" presStyleLbl="bgShp" presStyleIdx="1" presStyleCnt="3"/>
-      <dgm:spPr/>
-    </dgm:pt>
-    <dgm:pt modelId="{7EBFBBFE-C60D-406E-83E5-B82EB744E92B}" type="pres">
-      <dgm:prSet presAssocID="{DDC24D32-E1F2-46F3-80DF-2F960C53D79A}" presName="bgRectTx" presStyleLbl="bgShp" presStyleIdx="1" presStyleCnt="3">
-        <dgm:presLayoutVars>
-          <dgm:bulletEnabled val="1"/>
-        </dgm:presLayoutVars>
-      </dgm:prSet>
-      <dgm:spPr/>
-    </dgm:pt>
-    <dgm:pt modelId="{A16A3AE9-62B1-4C6E-B033-CAE38713C7B2}" type="pres">
-      <dgm:prSet presAssocID="{DDC24D32-E1F2-46F3-80DF-2F960C53D79A}" presName="spComp" presStyleCnt="0"/>
-      <dgm:spPr/>
-    </dgm:pt>
-    <dgm:pt modelId="{F140890D-D112-4225-98E6-D15629373752}" type="pres">
-      <dgm:prSet presAssocID="{DDC24D32-E1F2-46F3-80DF-2F960C53D79A}" presName="vSp" presStyleCnt="0"/>
-      <dgm:spPr/>
-    </dgm:pt>
-    <dgm:pt modelId="{B2FD22FA-F5A0-41A7-BA44-A42BBA8171B3}" type="pres">
-      <dgm:prSet presAssocID="{5886B898-FE96-4569-92A7-C70ED90E8690}" presName="rectComp" presStyleCnt="0"/>
-      <dgm:spPr/>
-    </dgm:pt>
-    <dgm:pt modelId="{7EB3B241-9331-4643-88DB-BC87C28C8D72}" type="pres">
-      <dgm:prSet presAssocID="{5886B898-FE96-4569-92A7-C70ED90E8690}" presName="bgRect" presStyleLbl="bgShp" presStyleIdx="2" presStyleCnt="3"/>
-      <dgm:spPr/>
-    </dgm:pt>
-    <dgm:pt modelId="{A5FC9992-5796-4EB8-B587-70F2EA027AF9}" type="pres">
-      <dgm:prSet presAssocID="{5886B898-FE96-4569-92A7-C70ED90E8690}" presName="bgRectTx" presStyleLbl="bgShp" presStyleIdx="2" presStyleCnt="3">
-        <dgm:presLayoutVars>
-          <dgm:bulletEnabled val="1"/>
-        </dgm:presLayoutVars>
-      </dgm:prSet>
-      <dgm:spPr/>
-    </dgm:pt>
   </dgm:ptLst>
   <dgm:cxnLst>
-    <dgm:cxn modelId="{ADCB8761-0808-40BE-B733-BE4B54EE712C}" srcId="{C9423769-D2C8-4F94-846B-7D5A16C918E2}" destId="{5886B898-FE96-4569-92A7-C70ED90E8690}" srcOrd="3" destOrd="0" parTransId="{BCF51EA3-9D11-4B3B-9765-562538CC1898}" sibTransId="{90337B25-0C40-4509-8B1F-540451EBA8BC}"/>
-    <dgm:cxn modelId="{78F40471-4898-4979-A5D9-A3B741F9655D}" type="presOf" srcId="{DDC24D32-E1F2-46F3-80DF-2F960C53D79A}" destId="{A05F9B63-8F7E-4D2E-A54D-E75C443C0853}" srcOrd="0" destOrd="0" presId="urn:microsoft.com/office/officeart/2005/8/layout/hierarchy6"/>
-    <dgm:cxn modelId="{D4191855-F451-4C6B-A583-BB501F4A10D6}" type="presOf" srcId="{14EE3551-C957-401B-BE55-6A86EC1BB91D}" destId="{74E3C15C-C478-4A6D-9FF3-524873CAFEDE}" srcOrd="1" destOrd="0" presId="urn:microsoft.com/office/officeart/2005/8/layout/hierarchy6"/>
     <dgm:cxn modelId="{C8B8717C-4640-42FB-B1FE-32A6D31BCEDE}" type="presOf" srcId="{B727F245-4F93-4119-B764-B9ADAED66400}" destId="{822E8B1A-00BA-4B0F-90B8-18F0336C57F6}" srcOrd="0" destOrd="0" presId="urn:microsoft.com/office/officeart/2005/8/layout/hierarchy6"/>
-    <dgm:cxn modelId="{A57B8185-98C4-4DAB-9CC8-9496B6AE03FB}" type="presOf" srcId="{5886B898-FE96-4569-92A7-C70ED90E8690}" destId="{7EB3B241-9331-4643-88DB-BC87C28C8D72}" srcOrd="0" destOrd="0" presId="urn:microsoft.com/office/officeart/2005/8/layout/hierarchy6"/>
     <dgm:cxn modelId="{69B7F588-2CB4-4C6F-9666-026BE0B175FA}" srcId="{B727F245-4F93-4119-B764-B9ADAED66400}" destId="{B384ECA6-AD20-4D0D-AA7C-A433FC69E5C2}" srcOrd="0" destOrd="0" parTransId="{20529B5F-1AFA-4853-AFC2-AA3CC05FC23F}" sibTransId="{F4EB0A57-0DA4-49AF-BEA4-499052467AFF}"/>
     <dgm:cxn modelId="{6A55C08C-FC8E-4747-95AF-12B979CE6341}" type="presOf" srcId="{B384ECA6-AD20-4D0D-AA7C-A433FC69E5C2}" destId="{05A807ED-5EF2-45D8-AE5B-1CD7418B6077}" srcOrd="0" destOrd="0" presId="urn:microsoft.com/office/officeart/2005/8/layout/hierarchy6"/>
     <dgm:cxn modelId="{0E51708F-E48F-444E-A80E-AD659DC95D65}" type="presOf" srcId="{C9423769-D2C8-4F94-846B-7D5A16C918E2}" destId="{E25C3278-2C7F-4DF4-954B-3BDD0C883031}" srcOrd="0" destOrd="0" presId="urn:microsoft.com/office/officeart/2005/8/layout/hierarchy6"/>
-    <dgm:cxn modelId="{EF0D66A1-0162-47AE-9161-ABD33AE723C0}" type="presOf" srcId="{DDC24D32-E1F2-46F3-80DF-2F960C53D79A}" destId="{7EBFBBFE-C60D-406E-83E5-B82EB744E92B}" srcOrd="1" destOrd="0" presId="urn:microsoft.com/office/officeart/2005/8/layout/hierarchy6"/>
-    <dgm:cxn modelId="{94908DAA-0E6B-41D3-B070-1EDB6F1045F3}" type="presOf" srcId="{5886B898-FE96-4569-92A7-C70ED90E8690}" destId="{A5FC9992-5796-4EB8-B587-70F2EA027AF9}" srcOrd="1" destOrd="0" presId="urn:microsoft.com/office/officeart/2005/8/layout/hierarchy6"/>
-    <dgm:cxn modelId="{536684AF-4E3F-4CA8-8D45-C93F02624F6E}" type="presOf" srcId="{14EE3551-C957-401B-BE55-6A86EC1BB91D}" destId="{81D8F765-1C2B-47E8-9104-BC25204BF581}" srcOrd="0" destOrd="0" presId="urn:microsoft.com/office/officeart/2005/8/layout/hierarchy6"/>
     <dgm:cxn modelId="{E91C4EB6-9192-4B3D-91D5-75EC00493A32}" type="presOf" srcId="{CFD67C2E-3F59-4D51-8814-276F3C03B1CF}" destId="{96C48980-A0CD-4E4A-BC68-F2194729EB0A}" srcOrd="0" destOrd="0" presId="urn:microsoft.com/office/officeart/2005/8/layout/hierarchy6"/>
     <dgm:cxn modelId="{EFF78ABE-75F6-411E-8E36-C7AE830E4D44}" srcId="{C9423769-D2C8-4F94-846B-7D5A16C918E2}" destId="{8BD4BDAD-9251-4A3C-A964-FB3942EBF29F}" srcOrd="0" destOrd="0" parTransId="{ED78E4F0-8793-4ED6-8C78-C2E08BE3F2BA}" sibTransId="{1157FA12-ABF6-4921-A224-938A84516575}"/>
     <dgm:cxn modelId="{AEDD7DC0-9F43-4711-87AC-7643E618D19C}" srcId="{8BD4BDAD-9251-4A3C-A964-FB3942EBF29F}" destId="{B727F245-4F93-4119-B764-B9ADAED66400}" srcOrd="0" destOrd="0" parTransId="{CFD67C2E-3F59-4D51-8814-276F3C03B1CF}" sibTransId="{D0B6F159-445B-4E64-AC44-9F6793D8E73F}"/>
-    <dgm:cxn modelId="{3376FCCA-36BE-48E1-A636-FC7F1AD7E577}" srcId="{C9423769-D2C8-4F94-846B-7D5A16C918E2}" destId="{14EE3551-C957-401B-BE55-6A86EC1BB91D}" srcOrd="1" destOrd="0" parTransId="{5FE8A452-5873-496E-8782-9717A8384B3D}" sibTransId="{5C65FFE3-0C25-409A-97D3-4C866BF7EA3E}"/>
-    <dgm:cxn modelId="{84CC86D6-1625-4404-B1B0-F2A904189D1B}" srcId="{C9423769-D2C8-4F94-846B-7D5A16C918E2}" destId="{DDC24D32-E1F2-46F3-80DF-2F960C53D79A}" srcOrd="2" destOrd="0" parTransId="{67F65B4F-411F-4A54-B17C-3850B3FACCFF}" sibTransId="{6EB03620-DFA9-4125-BF30-A06B825535C2}"/>
     <dgm:cxn modelId="{51A9A4E0-6AE1-4DB1-9D47-B0144A383F1B}" type="presOf" srcId="{20529B5F-1AFA-4853-AFC2-AA3CC05FC23F}" destId="{ECFCD44B-153F-47BE-AC0B-085156E5B810}" srcOrd="0" destOrd="0" presId="urn:microsoft.com/office/officeart/2005/8/layout/hierarchy6"/>
     <dgm:cxn modelId="{455DC9E1-80F7-474E-A73D-30D20028DE0D}" type="presOf" srcId="{8BD4BDAD-9251-4A3C-A964-FB3942EBF29F}" destId="{DAEBC06F-7250-4148-A5DF-9E74C1131D38}" srcOrd="0" destOrd="0" presId="urn:microsoft.com/office/officeart/2005/8/layout/hierarchy6"/>
     <dgm:cxn modelId="{82F5D592-66F3-49C8-B449-863DCE028881}" type="presParOf" srcId="{E25C3278-2C7F-4DF4-954B-3BDD0C883031}" destId="{7939B062-BDC8-483B-909B-4E2A2E729CFE}" srcOrd="0" destOrd="0" presId="urn:microsoft.com/office/officeart/2005/8/layout/hierarchy6"/>
-    <dgm:cxn modelId="{1E74FA72-9F50-4660-8778-74F9833FCF5B}" type="presParOf" srcId="{7939B062-BDC8-483B-909B-4E2A2E729CFE}" destId="{FD490BC2-F399-4417-AE01-4379DD21EB0B}" srcOrd="0" destOrd="0" presId="urn:microsoft.com/office/officeart/2005/8/layout/hierarchy6"/>
-    <dgm:cxn modelId="{DCA94637-5C4E-47C4-A3C0-AA22CB002FE8}" type="presParOf" srcId="{7939B062-BDC8-483B-909B-4E2A2E729CFE}" destId="{CDCBC623-5754-4B61-B38C-15EDDFA5C265}" srcOrd="1" destOrd="0" presId="urn:microsoft.com/office/officeart/2005/8/layout/hierarchy6"/>
+    <dgm:cxn modelId="{DCA94637-5C4E-47C4-A3C0-AA22CB002FE8}" type="presParOf" srcId="{7939B062-BDC8-483B-909B-4E2A2E729CFE}" destId="{CDCBC623-5754-4B61-B38C-15EDDFA5C265}" srcOrd="0" destOrd="0" presId="urn:microsoft.com/office/officeart/2005/8/layout/hierarchy6"/>
     <dgm:cxn modelId="{43089E3A-E60A-4BF6-8E4C-49E234DCE456}" type="presParOf" srcId="{CDCBC623-5754-4B61-B38C-15EDDFA5C265}" destId="{B4106418-510A-4861-925C-4927D39F0893}" srcOrd="0" destOrd="0" presId="urn:microsoft.com/office/officeart/2005/8/layout/hierarchy6"/>
     <dgm:cxn modelId="{8C89053D-6935-419E-BF34-8C03C79B9B1E}" type="presParOf" srcId="{B4106418-510A-4861-925C-4927D39F0893}" destId="{DAEBC06F-7250-4148-A5DF-9E74C1131D38}" srcOrd="0" destOrd="0" presId="urn:microsoft.com/office/officeart/2005/8/layout/hierarchy6"/>
     <dgm:cxn modelId="{1246D743-D436-4704-A5D4-956DF15E3D1B}" type="presParOf" srcId="{B4106418-510A-4861-925C-4927D39F0893}" destId="{E78A51DE-1261-4AFF-B26A-CF8585F9FD21}" srcOrd="1" destOrd="0" presId="urn:microsoft.com/office/officeart/2005/8/layout/hierarchy6"/>
@@ -3975,19 +3279,6 @@
     <dgm:cxn modelId="{A335EEE0-2A83-4AD0-82E2-2F0A95234343}" type="presParOf" srcId="{766C36B4-47B4-4CBE-91F2-1523D930C047}" destId="{05A807ED-5EF2-45D8-AE5B-1CD7418B6077}" srcOrd="0" destOrd="0" presId="urn:microsoft.com/office/officeart/2005/8/layout/hierarchy6"/>
     <dgm:cxn modelId="{14442DF3-6683-4C80-BF3B-01CC97719813}" type="presParOf" srcId="{766C36B4-47B4-4CBE-91F2-1523D930C047}" destId="{396B722E-DC46-4605-AFBB-953715D77021}" srcOrd="1" destOrd="0" presId="urn:microsoft.com/office/officeart/2005/8/layout/hierarchy6"/>
     <dgm:cxn modelId="{63938257-EE03-4A89-8208-97FA13EFC739}" type="presParOf" srcId="{E25C3278-2C7F-4DF4-954B-3BDD0C883031}" destId="{3EDE3D2C-4134-4B81-980B-39AA11B65F76}" srcOrd="1" destOrd="0" presId="urn:microsoft.com/office/officeart/2005/8/layout/hierarchy6"/>
-    <dgm:cxn modelId="{F75FCC67-0A72-48F8-99C0-9BACF2E82846}" type="presParOf" srcId="{3EDE3D2C-4134-4B81-980B-39AA11B65F76}" destId="{9812C23C-142D-4DA7-8BDB-B80C152169B2}" srcOrd="0" destOrd="0" presId="urn:microsoft.com/office/officeart/2005/8/layout/hierarchy6"/>
-    <dgm:cxn modelId="{BD6567C2-D1C1-45B1-B633-46292BA4E66B}" type="presParOf" srcId="{9812C23C-142D-4DA7-8BDB-B80C152169B2}" destId="{81D8F765-1C2B-47E8-9104-BC25204BF581}" srcOrd="0" destOrd="0" presId="urn:microsoft.com/office/officeart/2005/8/layout/hierarchy6"/>
-    <dgm:cxn modelId="{9BB25932-8E13-4881-B786-B9BD4C9B0A9D}" type="presParOf" srcId="{9812C23C-142D-4DA7-8BDB-B80C152169B2}" destId="{74E3C15C-C478-4A6D-9FF3-524873CAFEDE}" srcOrd="1" destOrd="0" presId="urn:microsoft.com/office/officeart/2005/8/layout/hierarchy6"/>
-    <dgm:cxn modelId="{04D55B79-EE00-4ED1-BE42-9CFE944D81A4}" type="presParOf" srcId="{3EDE3D2C-4134-4B81-980B-39AA11B65F76}" destId="{55BEA8F3-DFE0-4F98-99CE-55A83BCBD8B2}" srcOrd="1" destOrd="0" presId="urn:microsoft.com/office/officeart/2005/8/layout/hierarchy6"/>
-    <dgm:cxn modelId="{EABB68E1-6100-44A7-A750-D33C93A33DD2}" type="presParOf" srcId="{55BEA8F3-DFE0-4F98-99CE-55A83BCBD8B2}" destId="{DF825ED0-0132-4F1F-8071-8195DC9ADB0C}" srcOrd="0" destOrd="0" presId="urn:microsoft.com/office/officeart/2005/8/layout/hierarchy6"/>
-    <dgm:cxn modelId="{3847A056-1DCC-41F7-9363-05E6CEADBF97}" type="presParOf" srcId="{3EDE3D2C-4134-4B81-980B-39AA11B65F76}" destId="{55D03013-9FF8-4249-A6BF-4565A19718FD}" srcOrd="2" destOrd="0" presId="urn:microsoft.com/office/officeart/2005/8/layout/hierarchy6"/>
-    <dgm:cxn modelId="{212AF351-93F9-48F7-A502-92C8B36DA502}" type="presParOf" srcId="{55D03013-9FF8-4249-A6BF-4565A19718FD}" destId="{A05F9B63-8F7E-4D2E-A54D-E75C443C0853}" srcOrd="0" destOrd="0" presId="urn:microsoft.com/office/officeart/2005/8/layout/hierarchy6"/>
-    <dgm:cxn modelId="{3F8A5569-20F4-47C5-9843-BA1F322FBFE2}" type="presParOf" srcId="{55D03013-9FF8-4249-A6BF-4565A19718FD}" destId="{7EBFBBFE-C60D-406E-83E5-B82EB744E92B}" srcOrd="1" destOrd="0" presId="urn:microsoft.com/office/officeart/2005/8/layout/hierarchy6"/>
-    <dgm:cxn modelId="{B5DC3CC0-1099-41BD-8296-C90EB8DA0A88}" type="presParOf" srcId="{3EDE3D2C-4134-4B81-980B-39AA11B65F76}" destId="{A16A3AE9-62B1-4C6E-B033-CAE38713C7B2}" srcOrd="3" destOrd="0" presId="urn:microsoft.com/office/officeart/2005/8/layout/hierarchy6"/>
-    <dgm:cxn modelId="{A85F6DAF-1301-41DF-8637-919F6ECF9BFF}" type="presParOf" srcId="{A16A3AE9-62B1-4C6E-B033-CAE38713C7B2}" destId="{F140890D-D112-4225-98E6-D15629373752}" srcOrd="0" destOrd="0" presId="urn:microsoft.com/office/officeart/2005/8/layout/hierarchy6"/>
-    <dgm:cxn modelId="{3E4844E0-A036-470E-8862-3AB1B295F123}" type="presParOf" srcId="{3EDE3D2C-4134-4B81-980B-39AA11B65F76}" destId="{B2FD22FA-F5A0-41A7-BA44-A42BBA8171B3}" srcOrd="4" destOrd="0" presId="urn:microsoft.com/office/officeart/2005/8/layout/hierarchy6"/>
-    <dgm:cxn modelId="{D626ABD6-54F0-4AF6-B650-71785A3DEF79}" type="presParOf" srcId="{B2FD22FA-F5A0-41A7-BA44-A42BBA8171B3}" destId="{7EB3B241-9331-4643-88DB-BC87C28C8D72}" srcOrd="0" destOrd="0" presId="urn:microsoft.com/office/officeart/2005/8/layout/hierarchy6"/>
-    <dgm:cxn modelId="{8147040A-CEBB-4A33-AF50-604EE2448F33}" type="presParOf" srcId="{B2FD22FA-F5A0-41A7-BA44-A42BBA8171B3}" destId="{A5FC9992-5796-4EB8-B587-70F2EA027AF9}" srcOrd="1" destOrd="0" presId="urn:microsoft.com/office/officeart/2005/8/layout/hierarchy6"/>
   </dgm:cxnLst>
   <dgm:bg/>
   <dgm:whole/>
@@ -4007,341 +3298,6 @@
       <dsp:cNvGrpSpPr/>
     </dsp:nvGrpSpPr>
     <dsp:grpSpPr/>
-    <dsp:sp modelId="{5C0FE9C0-3228-4E31-BF86-3B2D3024054D}">
-      <dsp:nvSpPr>
-        <dsp:cNvPr id="0" name=""/>
-        <dsp:cNvSpPr/>
-      </dsp:nvSpPr>
-      <dsp:spPr>
-        <a:xfrm>
-          <a:off x="0" y="3339504"/>
-          <a:ext cx="6096000" cy="713184"/>
-        </a:xfrm>
-        <a:prstGeom prst="roundRect">
-          <a:avLst>
-            <a:gd name="adj" fmla="val 10000"/>
-          </a:avLst>
-        </a:prstGeom>
-        <a:solidFill>
-          <a:schemeClr val="accent1">
-            <a:tint val="40000"/>
-            <a:hueOff val="0"/>
-            <a:satOff val="0"/>
-            <a:lumOff val="0"/>
-            <a:alphaOff val="0"/>
-          </a:schemeClr>
-        </a:solidFill>
-        <a:ln>
-          <a:noFill/>
-        </a:ln>
-        <a:effectLst/>
-      </dsp:spPr>
-      <dsp:style>
-        <a:lnRef idx="0">
-          <a:scrgbClr r="0" g="0" b="0"/>
-        </a:lnRef>
-        <a:fillRef idx="1">
-          <a:scrgbClr r="0" g="0" b="0"/>
-        </a:fillRef>
-        <a:effectRef idx="0">
-          <a:scrgbClr r="0" g="0" b="0"/>
-        </a:effectRef>
-        <a:fontRef idx="minor"/>
-      </dsp:style>
-      <dsp:txBody>
-        <a:bodyPr spcFirstLastPara="0" vert="horz" wrap="square" lIns="177800" tIns="177800" rIns="177800" bIns="177800" numCol="1" spcCol="1270" anchor="ctr" anchorCtr="0">
-          <a:noAutofit/>
-        </a:bodyPr>
-        <a:lstStyle/>
-        <a:p>
-          <a:pPr marL="0" lvl="0" indent="0" algn="ctr" defTabSz="1111250">
-            <a:lnSpc>
-              <a:spcPct val="90000"/>
-            </a:lnSpc>
-            <a:spcBef>
-              <a:spcPct val="0"/>
-            </a:spcBef>
-            <a:spcAft>
-              <a:spcPct val="35000"/>
-            </a:spcAft>
-            <a:buNone/>
-          </a:pPr>
-          <a:endParaRPr lang="en-US" sz="2500" kern="1200" dirty="0"/>
-        </a:p>
-      </dsp:txBody>
-      <dsp:txXfrm>
-        <a:off x="0" y="3339504"/>
-        <a:ext cx="1828800" cy="713184"/>
-      </dsp:txXfrm>
-    </dsp:sp>
-    <dsp:sp modelId="{0F23B32A-8F9D-4DE7-8AEF-6326095BEE13}">
-      <dsp:nvSpPr>
-        <dsp:cNvPr id="0" name=""/>
-        <dsp:cNvSpPr/>
-      </dsp:nvSpPr>
-      <dsp:spPr>
-        <a:xfrm>
-          <a:off x="0" y="2507456"/>
-          <a:ext cx="6096000" cy="713184"/>
-        </a:xfrm>
-        <a:prstGeom prst="roundRect">
-          <a:avLst>
-            <a:gd name="adj" fmla="val 10000"/>
-          </a:avLst>
-        </a:prstGeom>
-        <a:solidFill>
-          <a:schemeClr val="accent1">
-            <a:tint val="40000"/>
-            <a:hueOff val="0"/>
-            <a:satOff val="0"/>
-            <a:lumOff val="0"/>
-            <a:alphaOff val="0"/>
-          </a:schemeClr>
-        </a:solidFill>
-        <a:ln>
-          <a:noFill/>
-        </a:ln>
-        <a:effectLst/>
-      </dsp:spPr>
-      <dsp:style>
-        <a:lnRef idx="0">
-          <a:scrgbClr r="0" g="0" b="0"/>
-        </a:lnRef>
-        <a:fillRef idx="1">
-          <a:scrgbClr r="0" g="0" b="0"/>
-        </a:fillRef>
-        <a:effectRef idx="0">
-          <a:scrgbClr r="0" g="0" b="0"/>
-        </a:effectRef>
-        <a:fontRef idx="minor"/>
-      </dsp:style>
-      <dsp:txBody>
-        <a:bodyPr spcFirstLastPara="0" vert="horz" wrap="square" lIns="177800" tIns="177800" rIns="177800" bIns="177800" numCol="1" spcCol="1270" anchor="ctr" anchorCtr="0">
-          <a:noAutofit/>
-        </a:bodyPr>
-        <a:lstStyle/>
-        <a:p>
-          <a:pPr marL="0" lvl="0" indent="0" algn="ctr" defTabSz="1111250">
-            <a:lnSpc>
-              <a:spcPct val="90000"/>
-            </a:lnSpc>
-            <a:spcBef>
-              <a:spcPct val="0"/>
-            </a:spcBef>
-            <a:spcAft>
-              <a:spcPct val="35000"/>
-            </a:spcAft>
-            <a:buNone/>
-          </a:pPr>
-          <a:endParaRPr lang="en-US" sz="2500" kern="1200" dirty="0"/>
-        </a:p>
-      </dsp:txBody>
-      <dsp:txXfrm>
-        <a:off x="0" y="2507456"/>
-        <a:ext cx="1828800" cy="713184"/>
-      </dsp:txXfrm>
-    </dsp:sp>
-    <dsp:sp modelId="{7EB3B241-9331-4643-88DB-BC87C28C8D72}">
-      <dsp:nvSpPr>
-        <dsp:cNvPr id="0" name=""/>
-        <dsp:cNvSpPr/>
-      </dsp:nvSpPr>
-      <dsp:spPr>
-        <a:xfrm>
-          <a:off x="0" y="1675407"/>
-          <a:ext cx="6096000" cy="713184"/>
-        </a:xfrm>
-        <a:prstGeom prst="roundRect">
-          <a:avLst>
-            <a:gd name="adj" fmla="val 10000"/>
-          </a:avLst>
-        </a:prstGeom>
-        <a:solidFill>
-          <a:schemeClr val="accent1">
-            <a:tint val="40000"/>
-            <a:hueOff val="0"/>
-            <a:satOff val="0"/>
-            <a:lumOff val="0"/>
-            <a:alphaOff val="0"/>
-          </a:schemeClr>
-        </a:solidFill>
-        <a:ln>
-          <a:noFill/>
-        </a:ln>
-        <a:effectLst/>
-      </dsp:spPr>
-      <dsp:style>
-        <a:lnRef idx="0">
-          <a:scrgbClr r="0" g="0" b="0"/>
-        </a:lnRef>
-        <a:fillRef idx="1">
-          <a:scrgbClr r="0" g="0" b="0"/>
-        </a:fillRef>
-        <a:effectRef idx="0">
-          <a:scrgbClr r="0" g="0" b="0"/>
-        </a:effectRef>
-        <a:fontRef idx="minor"/>
-      </dsp:style>
-      <dsp:txBody>
-        <a:bodyPr spcFirstLastPara="0" vert="horz" wrap="square" lIns="177800" tIns="177800" rIns="177800" bIns="177800" numCol="1" spcCol="1270" anchor="ctr" anchorCtr="0">
-          <a:noAutofit/>
-        </a:bodyPr>
-        <a:lstStyle/>
-        <a:p>
-          <a:pPr marL="0" lvl="0" indent="0" algn="ctr" defTabSz="1111250">
-            <a:lnSpc>
-              <a:spcPct val="90000"/>
-            </a:lnSpc>
-            <a:spcBef>
-              <a:spcPct val="0"/>
-            </a:spcBef>
-            <a:spcAft>
-              <a:spcPct val="35000"/>
-            </a:spcAft>
-            <a:buNone/>
-          </a:pPr>
-          <a:endParaRPr lang="en-US" sz="2500" kern="1200" dirty="0"/>
-        </a:p>
-      </dsp:txBody>
-      <dsp:txXfrm>
-        <a:off x="0" y="1675407"/>
-        <a:ext cx="1828800" cy="713184"/>
-      </dsp:txXfrm>
-    </dsp:sp>
-    <dsp:sp modelId="{A05F9B63-8F7E-4D2E-A54D-E75C443C0853}">
-      <dsp:nvSpPr>
-        <dsp:cNvPr id="0" name=""/>
-        <dsp:cNvSpPr/>
-      </dsp:nvSpPr>
-      <dsp:spPr>
-        <a:xfrm>
-          <a:off x="0" y="843359"/>
-          <a:ext cx="6096000" cy="713184"/>
-        </a:xfrm>
-        <a:prstGeom prst="roundRect">
-          <a:avLst>
-            <a:gd name="adj" fmla="val 10000"/>
-          </a:avLst>
-        </a:prstGeom>
-        <a:solidFill>
-          <a:schemeClr val="accent1">
-            <a:tint val="40000"/>
-            <a:hueOff val="0"/>
-            <a:satOff val="0"/>
-            <a:lumOff val="0"/>
-            <a:alphaOff val="0"/>
-          </a:schemeClr>
-        </a:solidFill>
-        <a:ln>
-          <a:noFill/>
-        </a:ln>
-        <a:effectLst/>
-      </dsp:spPr>
-      <dsp:style>
-        <a:lnRef idx="0">
-          <a:scrgbClr r="0" g="0" b="0"/>
-        </a:lnRef>
-        <a:fillRef idx="1">
-          <a:scrgbClr r="0" g="0" b="0"/>
-        </a:fillRef>
-        <a:effectRef idx="0">
-          <a:scrgbClr r="0" g="0" b="0"/>
-        </a:effectRef>
-        <a:fontRef idx="minor"/>
-      </dsp:style>
-      <dsp:txBody>
-        <a:bodyPr spcFirstLastPara="0" vert="horz" wrap="square" lIns="177800" tIns="177800" rIns="177800" bIns="177800" numCol="1" spcCol="1270" anchor="ctr" anchorCtr="0">
-          <a:noAutofit/>
-        </a:bodyPr>
-        <a:lstStyle/>
-        <a:p>
-          <a:pPr marL="0" lvl="0" indent="0" algn="ctr" defTabSz="1111250">
-            <a:lnSpc>
-              <a:spcPct val="90000"/>
-            </a:lnSpc>
-            <a:spcBef>
-              <a:spcPct val="0"/>
-            </a:spcBef>
-            <a:spcAft>
-              <a:spcPct val="35000"/>
-            </a:spcAft>
-            <a:buNone/>
-          </a:pPr>
-          <a:endParaRPr lang="en-US" sz="2500" kern="1200" dirty="0"/>
-        </a:p>
-      </dsp:txBody>
-      <dsp:txXfrm>
-        <a:off x="0" y="843359"/>
-        <a:ext cx="1828800" cy="713184"/>
-      </dsp:txXfrm>
-    </dsp:sp>
-    <dsp:sp modelId="{81D8F765-1C2B-47E8-9104-BC25204BF581}">
-      <dsp:nvSpPr>
-        <dsp:cNvPr id="0" name=""/>
-        <dsp:cNvSpPr/>
-      </dsp:nvSpPr>
-      <dsp:spPr>
-        <a:xfrm>
-          <a:off x="0" y="0"/>
-          <a:ext cx="6096000" cy="713184"/>
-        </a:xfrm>
-        <a:prstGeom prst="roundRect">
-          <a:avLst>
-            <a:gd name="adj" fmla="val 10000"/>
-          </a:avLst>
-        </a:prstGeom>
-        <a:solidFill>
-          <a:schemeClr val="accent1">
-            <a:tint val="40000"/>
-            <a:hueOff val="0"/>
-            <a:satOff val="0"/>
-            <a:lumOff val="0"/>
-            <a:alphaOff val="0"/>
-          </a:schemeClr>
-        </a:solidFill>
-        <a:ln>
-          <a:noFill/>
-        </a:ln>
-        <a:effectLst/>
-      </dsp:spPr>
-      <dsp:style>
-        <a:lnRef idx="0">
-          <a:scrgbClr r="0" g="0" b="0"/>
-        </a:lnRef>
-        <a:fillRef idx="1">
-          <a:scrgbClr r="0" g="0" b="0"/>
-        </a:fillRef>
-        <a:effectRef idx="0">
-          <a:scrgbClr r="0" g="0" b="0"/>
-        </a:effectRef>
-        <a:fontRef idx="minor"/>
-      </dsp:style>
-      <dsp:txBody>
-        <a:bodyPr spcFirstLastPara="0" vert="horz" wrap="square" lIns="177800" tIns="177800" rIns="177800" bIns="177800" numCol="1" spcCol="1270" anchor="ctr" anchorCtr="0">
-          <a:noAutofit/>
-        </a:bodyPr>
-        <a:lstStyle/>
-        <a:p>
-          <a:pPr marL="0" lvl="0" indent="0" algn="ctr" defTabSz="1111250">
-            <a:lnSpc>
-              <a:spcPct val="90000"/>
-            </a:lnSpc>
-            <a:spcBef>
-              <a:spcPct val="0"/>
-            </a:spcBef>
-            <a:spcAft>
-              <a:spcPct val="35000"/>
-            </a:spcAft>
-            <a:buNone/>
-          </a:pPr>
-          <a:endParaRPr lang="en-US" sz="2500" kern="1200" dirty="0"/>
-        </a:p>
-      </dsp:txBody>
-      <dsp:txXfrm>
-        <a:off x="0" y="0"/>
-        <a:ext cx="1828800" cy="713184"/>
-      </dsp:txXfrm>
-    </dsp:sp>
     <dsp:sp modelId="{DAEBC06F-7250-4148-A5DF-9E74C1131D38}">
       <dsp:nvSpPr>
         <dsp:cNvPr id="0" name=""/>
@@ -4349,8 +3305,8 @@
       </dsp:nvSpPr>
       <dsp:spPr>
         <a:xfrm>
-          <a:off x="3455699" y="70742"/>
-          <a:ext cx="891480" cy="594320"/>
+          <a:off x="3105787" y="2361"/>
+          <a:ext cx="1165233" cy="776822"/>
         </a:xfrm>
         <a:prstGeom prst="roundRect">
           <a:avLst>
@@ -4394,12 +3350,12 @@
         </a:fontRef>
       </dsp:style>
       <dsp:txBody>
-        <a:bodyPr spcFirstLastPara="0" vert="horz" wrap="square" lIns="41910" tIns="41910" rIns="41910" bIns="41910" numCol="1" spcCol="1270" anchor="ctr" anchorCtr="0">
+        <a:bodyPr spcFirstLastPara="0" vert="horz" wrap="square" lIns="53340" tIns="53340" rIns="53340" bIns="53340" numCol="1" spcCol="1270" anchor="ctr" anchorCtr="0">
           <a:noAutofit/>
         </a:bodyPr>
         <a:lstStyle/>
         <a:p>
-          <a:pPr marL="0" lvl="0" indent="0" algn="ctr" defTabSz="488950">
+          <a:pPr marL="0" lvl="0" indent="0" algn="ctr" defTabSz="622300">
             <a:lnSpc>
               <a:spcPct val="90000"/>
             </a:lnSpc>
@@ -4412,18 +3368,18 @@
             <a:buNone/>
           </a:pPr>
           <a:r>
-            <a:rPr lang="en-US" sz="1100" kern="1200" dirty="0" err="1"/>
+            <a:rPr lang="en-US" sz="1400" kern="1200" dirty="0" err="1"/>
             <a:t>Fasta</a:t>
           </a:r>
           <a:r>
-            <a:rPr lang="en-US" sz="1100" kern="1200" dirty="0"/>
+            <a:rPr lang="en-US" sz="1400" kern="1200" dirty="0"/>
             <a:t> file</a:t>
           </a:r>
         </a:p>
       </dsp:txBody>
       <dsp:txXfrm>
-        <a:off x="3473106" y="88149"/>
-        <a:ext cx="856666" cy="559506"/>
+        <a:off x="3128539" y="25113"/>
+        <a:ext cx="1119729" cy="731318"/>
       </dsp:txXfrm>
     </dsp:sp>
     <dsp:sp modelId="{96C48980-A0CD-4E4A-BC68-F2194729EB0A}">
@@ -4433,8 +3389,8 @@
       </dsp:nvSpPr>
       <dsp:spPr>
         <a:xfrm>
-          <a:off x="3855720" y="665063"/>
-          <a:ext cx="91440" cy="237728"/>
+          <a:off x="3642684" y="779183"/>
+          <a:ext cx="91440" cy="310728"/>
         </a:xfrm>
         <a:custGeom>
           <a:avLst/>
@@ -4448,7 +3404,7 @@
                 <a:pt x="45720" y="0"/>
               </a:moveTo>
               <a:lnTo>
-                <a:pt x="45720" y="237728"/>
+                <a:pt x="45720" y="310728"/>
               </a:lnTo>
             </a:path>
           </a:pathLst>
@@ -4489,8 +3445,8 @@
       </dsp:nvSpPr>
       <dsp:spPr>
         <a:xfrm>
-          <a:off x="3455699" y="902791"/>
-          <a:ext cx="891480" cy="594320"/>
+          <a:off x="3105787" y="1089912"/>
+          <a:ext cx="1165233" cy="776822"/>
         </a:xfrm>
         <a:prstGeom prst="roundRect">
           <a:avLst>
@@ -4534,12 +3490,12 @@
         </a:fontRef>
       </dsp:style>
       <dsp:txBody>
-        <a:bodyPr spcFirstLastPara="0" vert="horz" wrap="square" lIns="41910" tIns="41910" rIns="41910" bIns="41910" numCol="1" spcCol="1270" anchor="ctr" anchorCtr="0">
+        <a:bodyPr spcFirstLastPara="0" vert="horz" wrap="square" lIns="53340" tIns="53340" rIns="53340" bIns="53340" numCol="1" spcCol="1270" anchor="ctr" anchorCtr="0">
           <a:noAutofit/>
         </a:bodyPr>
         <a:lstStyle/>
         <a:p>
-          <a:pPr marL="0" lvl="0" indent="0" algn="ctr" defTabSz="488950">
+          <a:pPr marL="0" lvl="0" indent="0" algn="ctr" defTabSz="622300">
             <a:lnSpc>
               <a:spcPct val="90000"/>
             </a:lnSpc>
@@ -4552,19 +3508,19 @@
             <a:buNone/>
           </a:pPr>
           <a:r>
-            <a:rPr lang="en-US" sz="1100" kern="1200" dirty="0"/>
+            <a:rPr lang="en-US" sz="1400" kern="1200" dirty="0"/>
             <a:t>Aligned using </a:t>
           </a:r>
           <a:r>
-            <a:rPr lang="en-US" sz="1100" kern="1200" dirty="0" err="1"/>
+            <a:rPr lang="en-US" sz="1400" kern="1200" dirty="0" err="1"/>
             <a:t>Clustal</a:t>
           </a:r>
-          <a:endParaRPr lang="en-US" sz="1100" kern="1200" dirty="0"/>
+          <a:endParaRPr lang="en-US" sz="1400" kern="1200" dirty="0"/>
         </a:p>
       </dsp:txBody>
       <dsp:txXfrm>
-        <a:off x="3473106" y="920198"/>
-        <a:ext cx="856666" cy="559506"/>
+        <a:off x="3128539" y="1112664"/>
+        <a:ext cx="1119729" cy="731318"/>
       </dsp:txXfrm>
     </dsp:sp>
     <dsp:sp modelId="{7B6EC39C-6336-4C4E-A454-54B9AA3030FF}">
@@ -4574,8 +3530,8 @@
       </dsp:nvSpPr>
       <dsp:spPr>
         <a:xfrm>
-          <a:off x="3855720" y="1497111"/>
-          <a:ext cx="91440" cy="237728"/>
+          <a:off x="3642684" y="1866734"/>
+          <a:ext cx="91440" cy="310728"/>
         </a:xfrm>
         <a:custGeom>
           <a:avLst/>
@@ -4589,7 +3545,7 @@
                 <a:pt x="45720" y="0"/>
               </a:moveTo>
               <a:lnTo>
-                <a:pt x="45720" y="237728"/>
+                <a:pt x="45720" y="310728"/>
               </a:lnTo>
             </a:path>
           </a:pathLst>
@@ -4630,8 +3586,8 @@
       </dsp:nvSpPr>
       <dsp:spPr>
         <a:xfrm>
-          <a:off x="3455699" y="1734839"/>
-          <a:ext cx="891480" cy="594320"/>
+          <a:off x="3105787" y="2177462"/>
+          <a:ext cx="1165233" cy="776822"/>
         </a:xfrm>
         <a:prstGeom prst="roundRect">
           <a:avLst>
@@ -4675,12 +3631,12 @@
         </a:fontRef>
       </dsp:style>
       <dsp:txBody>
-        <a:bodyPr spcFirstLastPara="0" vert="horz" wrap="square" lIns="41910" tIns="41910" rIns="41910" bIns="41910" numCol="1" spcCol="1270" anchor="ctr" anchorCtr="0">
+        <a:bodyPr spcFirstLastPara="0" vert="horz" wrap="square" lIns="53340" tIns="53340" rIns="53340" bIns="53340" numCol="1" spcCol="1270" anchor="ctr" anchorCtr="0">
           <a:noAutofit/>
         </a:bodyPr>
         <a:lstStyle/>
         <a:p>
-          <a:pPr marL="0" lvl="0" indent="0" algn="ctr" defTabSz="488950">
+          <a:pPr marL="0" lvl="0" indent="0" algn="ctr" defTabSz="622300">
             <a:lnSpc>
               <a:spcPct val="90000"/>
             </a:lnSpc>
@@ -4693,14 +3649,14 @@
             <a:buNone/>
           </a:pPr>
           <a:r>
-            <a:rPr lang="en-US" sz="1100" kern="1200" dirty="0"/>
+            <a:rPr lang="en-US" sz="1400" kern="1200" dirty="0"/>
             <a:t>Converted to Nexus format</a:t>
           </a:r>
         </a:p>
       </dsp:txBody>
       <dsp:txXfrm>
-        <a:off x="3473106" y="1752246"/>
-        <a:ext cx="856666" cy="559506"/>
+        <a:off x="3128539" y="2200214"/>
+        <a:ext cx="1119729" cy="731318"/>
       </dsp:txXfrm>
     </dsp:sp>
     <dsp:sp modelId="{5C9946F2-E2BB-4B54-B854-74F49C310EB2}">
@@ -4710,8 +3666,8 @@
       </dsp:nvSpPr>
       <dsp:spPr>
         <a:xfrm>
-          <a:off x="3855720" y="2329160"/>
-          <a:ext cx="91440" cy="237728"/>
+          <a:off x="3642684" y="2954285"/>
+          <a:ext cx="91440" cy="310728"/>
         </a:xfrm>
         <a:custGeom>
           <a:avLst/>
@@ -4725,7 +3681,7 @@
                 <a:pt x="45720" y="0"/>
               </a:moveTo>
               <a:lnTo>
-                <a:pt x="45720" y="237728"/>
+                <a:pt x="45720" y="310728"/>
               </a:lnTo>
             </a:path>
           </a:pathLst>
@@ -4766,8 +3722,8 @@
       </dsp:nvSpPr>
       <dsp:spPr>
         <a:xfrm>
-          <a:off x="3455699" y="2566888"/>
-          <a:ext cx="891480" cy="594320"/>
+          <a:off x="3105787" y="3265013"/>
+          <a:ext cx="1165233" cy="776822"/>
         </a:xfrm>
         <a:prstGeom prst="roundRect">
           <a:avLst>
@@ -4811,12 +3767,12 @@
         </a:fontRef>
       </dsp:style>
       <dsp:txBody>
-        <a:bodyPr spcFirstLastPara="0" vert="horz" wrap="square" lIns="41910" tIns="41910" rIns="41910" bIns="41910" numCol="1" spcCol="1270" anchor="ctr" anchorCtr="0">
+        <a:bodyPr spcFirstLastPara="0" vert="horz" wrap="square" lIns="53340" tIns="53340" rIns="53340" bIns="53340" numCol="1" spcCol="1270" anchor="ctr" anchorCtr="0">
           <a:noAutofit/>
         </a:bodyPr>
         <a:lstStyle/>
         <a:p>
-          <a:pPr marL="0" lvl="0" indent="0" algn="ctr" defTabSz="488950">
+          <a:pPr marL="0" lvl="0" indent="0" algn="ctr" defTabSz="622300">
             <a:lnSpc>
               <a:spcPct val="90000"/>
             </a:lnSpc>
@@ -4829,19 +3785,19 @@
             <a:buNone/>
           </a:pPr>
           <a:r>
-            <a:rPr lang="en-US" sz="1100" kern="1200" dirty="0"/>
+            <a:rPr lang="en-US" sz="1400" kern="1200" dirty="0"/>
             <a:t>Run </a:t>
           </a:r>
           <a:r>
-            <a:rPr lang="en-US" sz="1100" kern="1200" dirty="0" err="1"/>
+            <a:rPr lang="en-US" sz="1400" kern="1200" dirty="0" err="1"/>
             <a:t>MrBayes</a:t>
           </a:r>
-          <a:endParaRPr lang="en-US" sz="1100" kern="1200" dirty="0"/>
+          <a:endParaRPr lang="en-US" sz="1400" kern="1200" dirty="0"/>
         </a:p>
       </dsp:txBody>
       <dsp:txXfrm>
-        <a:off x="3473106" y="2584295"/>
-        <a:ext cx="856666" cy="559506"/>
+        <a:off x="3128539" y="3287765"/>
+        <a:ext cx="1119729" cy="731318"/>
       </dsp:txXfrm>
     </dsp:sp>
     <dsp:sp modelId="{ECFCD44B-153F-47BE-AC0B-085156E5B810}">
@@ -4851,8 +3807,8 @@
       </dsp:nvSpPr>
       <dsp:spPr>
         <a:xfrm>
-          <a:off x="3855720" y="3161208"/>
-          <a:ext cx="91440" cy="237728"/>
+          <a:off x="3642684" y="4041835"/>
+          <a:ext cx="91440" cy="310728"/>
         </a:xfrm>
         <a:custGeom>
           <a:avLst/>
@@ -4866,7 +3822,7 @@
                 <a:pt x="45720" y="0"/>
               </a:moveTo>
               <a:lnTo>
-                <a:pt x="45720" y="237728"/>
+                <a:pt x="45720" y="310728"/>
               </a:lnTo>
             </a:path>
           </a:pathLst>
@@ -4907,8 +3863,8 @@
       </dsp:nvSpPr>
       <dsp:spPr>
         <a:xfrm>
-          <a:off x="3455699" y="3398936"/>
-          <a:ext cx="891480" cy="594320"/>
+          <a:off x="3105787" y="4352564"/>
+          <a:ext cx="1165233" cy="776822"/>
         </a:xfrm>
         <a:prstGeom prst="roundRect">
           <a:avLst>
@@ -4952,12 +3908,12 @@
         </a:fontRef>
       </dsp:style>
       <dsp:txBody>
-        <a:bodyPr spcFirstLastPara="0" vert="horz" wrap="square" lIns="41910" tIns="41910" rIns="41910" bIns="41910" numCol="1" spcCol="1270" anchor="ctr" anchorCtr="0">
+        <a:bodyPr spcFirstLastPara="0" vert="horz" wrap="square" lIns="53340" tIns="53340" rIns="53340" bIns="53340" numCol="1" spcCol="1270" anchor="ctr" anchorCtr="0">
           <a:noAutofit/>
         </a:bodyPr>
         <a:lstStyle/>
         <a:p>
-          <a:pPr marL="0" lvl="0" indent="0" algn="ctr" defTabSz="488950">
+          <a:pPr marL="0" lvl="0" indent="0" algn="ctr" defTabSz="622300">
             <a:lnSpc>
               <a:spcPct val="90000"/>
             </a:lnSpc>
@@ -4970,14 +3926,14 @@
             <a:buNone/>
           </a:pPr>
           <a:r>
-            <a:rPr lang="en-US" sz="1100" kern="1200" dirty="0"/>
+            <a:rPr lang="en-US" sz="1400" kern="1200" dirty="0"/>
             <a:t>Visualization</a:t>
           </a:r>
         </a:p>
       </dsp:txBody>
       <dsp:txXfrm>
-        <a:off x="3473106" y="3416343"/>
-        <a:ext cx="856666" cy="559506"/>
+        <a:off x="3128539" y="4375316"/>
+        <a:ext cx="1119729" cy="731318"/>
       </dsp:txXfrm>
     </dsp:sp>
   </dsp:spTree>
@@ -4992,216 +3948,6 @@
       <dsp:cNvGrpSpPr/>
     </dsp:nvGrpSpPr>
     <dsp:grpSpPr/>
-    <dsp:sp modelId="{7EB3B241-9331-4643-88DB-BC87C28C8D72}">
-      <dsp:nvSpPr>
-        <dsp:cNvPr id="0" name=""/>
-        <dsp:cNvSpPr/>
-      </dsp:nvSpPr>
-      <dsp:spPr>
-        <a:xfrm>
-          <a:off x="0" y="2846009"/>
-          <a:ext cx="6096000" cy="1217990"/>
-        </a:xfrm>
-        <a:prstGeom prst="roundRect">
-          <a:avLst>
-            <a:gd name="adj" fmla="val 10000"/>
-          </a:avLst>
-        </a:prstGeom>
-        <a:solidFill>
-          <a:schemeClr val="accent1">
-            <a:tint val="40000"/>
-            <a:hueOff val="0"/>
-            <a:satOff val="0"/>
-            <a:lumOff val="0"/>
-            <a:alphaOff val="0"/>
-          </a:schemeClr>
-        </a:solidFill>
-        <a:ln>
-          <a:noFill/>
-        </a:ln>
-        <a:effectLst/>
-      </dsp:spPr>
-      <dsp:style>
-        <a:lnRef idx="0">
-          <a:scrgbClr r="0" g="0" b="0"/>
-        </a:lnRef>
-        <a:fillRef idx="1">
-          <a:scrgbClr r="0" g="0" b="0"/>
-        </a:fillRef>
-        <a:effectRef idx="0">
-          <a:scrgbClr r="0" g="0" b="0"/>
-        </a:effectRef>
-        <a:fontRef idx="minor"/>
-      </dsp:style>
-      <dsp:txBody>
-        <a:bodyPr spcFirstLastPara="0" vert="horz" wrap="square" lIns="305816" tIns="305816" rIns="305816" bIns="305816" numCol="1" spcCol="1270" anchor="ctr" anchorCtr="0">
-          <a:noAutofit/>
-        </a:bodyPr>
-        <a:lstStyle/>
-        <a:p>
-          <a:pPr marL="0" lvl="0" indent="0" algn="ctr" defTabSz="1911350">
-            <a:lnSpc>
-              <a:spcPct val="90000"/>
-            </a:lnSpc>
-            <a:spcBef>
-              <a:spcPct val="0"/>
-            </a:spcBef>
-            <a:spcAft>
-              <a:spcPct val="35000"/>
-            </a:spcAft>
-            <a:buNone/>
-          </a:pPr>
-          <a:r>
-            <a:rPr lang="en-US" sz="4300" kern="1200" dirty="0"/>
-            <a:t> </a:t>
-          </a:r>
-        </a:p>
-      </dsp:txBody>
-      <dsp:txXfrm>
-        <a:off x="0" y="2846009"/>
-        <a:ext cx="1828800" cy="1217990"/>
-      </dsp:txXfrm>
-    </dsp:sp>
-    <dsp:sp modelId="{A05F9B63-8F7E-4D2E-A54D-E75C443C0853}">
-      <dsp:nvSpPr>
-        <dsp:cNvPr id="0" name=""/>
-        <dsp:cNvSpPr/>
-      </dsp:nvSpPr>
-      <dsp:spPr>
-        <a:xfrm>
-          <a:off x="0" y="1423004"/>
-          <a:ext cx="6096000" cy="1217990"/>
-        </a:xfrm>
-        <a:prstGeom prst="roundRect">
-          <a:avLst>
-            <a:gd name="adj" fmla="val 10000"/>
-          </a:avLst>
-        </a:prstGeom>
-        <a:solidFill>
-          <a:schemeClr val="accent1">
-            <a:tint val="40000"/>
-            <a:hueOff val="0"/>
-            <a:satOff val="0"/>
-            <a:lumOff val="0"/>
-            <a:alphaOff val="0"/>
-          </a:schemeClr>
-        </a:solidFill>
-        <a:ln>
-          <a:noFill/>
-        </a:ln>
-        <a:effectLst/>
-      </dsp:spPr>
-      <dsp:style>
-        <a:lnRef idx="0">
-          <a:scrgbClr r="0" g="0" b="0"/>
-        </a:lnRef>
-        <a:fillRef idx="1">
-          <a:scrgbClr r="0" g="0" b="0"/>
-        </a:fillRef>
-        <a:effectRef idx="0">
-          <a:scrgbClr r="0" g="0" b="0"/>
-        </a:effectRef>
-        <a:fontRef idx="minor"/>
-      </dsp:style>
-      <dsp:txBody>
-        <a:bodyPr spcFirstLastPara="0" vert="horz" wrap="square" lIns="305816" tIns="305816" rIns="305816" bIns="305816" numCol="1" spcCol="1270" anchor="ctr" anchorCtr="0">
-          <a:noAutofit/>
-        </a:bodyPr>
-        <a:lstStyle/>
-        <a:p>
-          <a:pPr marL="0" lvl="0" indent="0" algn="ctr" defTabSz="1911350">
-            <a:lnSpc>
-              <a:spcPct val="90000"/>
-            </a:lnSpc>
-            <a:spcBef>
-              <a:spcPct val="0"/>
-            </a:spcBef>
-            <a:spcAft>
-              <a:spcPct val="35000"/>
-            </a:spcAft>
-            <a:buNone/>
-          </a:pPr>
-          <a:r>
-            <a:rPr lang="en-US" sz="4300" kern="1200" dirty="0"/>
-            <a:t> </a:t>
-          </a:r>
-        </a:p>
-      </dsp:txBody>
-      <dsp:txXfrm>
-        <a:off x="0" y="1423004"/>
-        <a:ext cx="1828800" cy="1217990"/>
-      </dsp:txXfrm>
-    </dsp:sp>
-    <dsp:sp modelId="{81D8F765-1C2B-47E8-9104-BC25204BF581}">
-      <dsp:nvSpPr>
-        <dsp:cNvPr id="0" name=""/>
-        <dsp:cNvSpPr/>
-      </dsp:nvSpPr>
-      <dsp:spPr>
-        <a:xfrm>
-          <a:off x="0" y="1020"/>
-          <a:ext cx="6096000" cy="1217990"/>
-        </a:xfrm>
-        <a:prstGeom prst="roundRect">
-          <a:avLst>
-            <a:gd name="adj" fmla="val 10000"/>
-          </a:avLst>
-        </a:prstGeom>
-        <a:solidFill>
-          <a:schemeClr val="accent1">
-            <a:tint val="40000"/>
-            <a:hueOff val="0"/>
-            <a:satOff val="0"/>
-            <a:lumOff val="0"/>
-            <a:alphaOff val="0"/>
-          </a:schemeClr>
-        </a:solidFill>
-        <a:ln>
-          <a:noFill/>
-        </a:ln>
-        <a:effectLst/>
-      </dsp:spPr>
-      <dsp:style>
-        <a:lnRef idx="0">
-          <a:scrgbClr r="0" g="0" b="0"/>
-        </a:lnRef>
-        <a:fillRef idx="1">
-          <a:scrgbClr r="0" g="0" b="0"/>
-        </a:fillRef>
-        <a:effectRef idx="0">
-          <a:scrgbClr r="0" g="0" b="0"/>
-        </a:effectRef>
-        <a:fontRef idx="minor"/>
-      </dsp:style>
-      <dsp:txBody>
-        <a:bodyPr spcFirstLastPara="0" vert="horz" wrap="square" lIns="305816" tIns="305816" rIns="305816" bIns="305816" numCol="1" spcCol="1270" anchor="ctr" anchorCtr="0">
-          <a:noAutofit/>
-        </a:bodyPr>
-        <a:lstStyle/>
-        <a:p>
-          <a:pPr marL="0" lvl="0" indent="0" algn="ctr" defTabSz="1911350">
-            <a:lnSpc>
-              <a:spcPct val="90000"/>
-            </a:lnSpc>
-            <a:spcBef>
-              <a:spcPct val="0"/>
-            </a:spcBef>
-            <a:spcAft>
-              <a:spcPct val="35000"/>
-            </a:spcAft>
-            <a:buNone/>
-          </a:pPr>
-          <a:r>
-            <a:rPr lang="en-US" sz="4300" kern="1200" dirty="0"/>
-            <a:t> </a:t>
-          </a:r>
-        </a:p>
-      </dsp:txBody>
-      <dsp:txXfrm>
-        <a:off x="0" y="1020"/>
-        <a:ext cx="1828800" cy="1217990"/>
-      </dsp:txXfrm>
-    </dsp:sp>
     <dsp:sp modelId="{DAEBC06F-7250-4148-A5DF-9E74C1131D38}">
       <dsp:nvSpPr>
         <dsp:cNvPr id="0" name=""/>
@@ -5209,8 +3955,8 @@
       </dsp:nvSpPr>
       <dsp:spPr>
         <a:xfrm>
-          <a:off x="3136463" y="103016"/>
-          <a:ext cx="1529953" cy="1019968"/>
+          <a:off x="3117764" y="445"/>
+          <a:ext cx="1603858" cy="1069239"/>
         </a:xfrm>
         <a:prstGeom prst="roundRect">
           <a:avLst>
@@ -5254,12 +4000,12 @@
         </a:fontRef>
       </dsp:style>
       <dsp:txBody>
-        <a:bodyPr spcFirstLastPara="0" vert="horz" wrap="square" lIns="83820" tIns="83820" rIns="83820" bIns="83820" numCol="1" spcCol="1270" anchor="ctr" anchorCtr="0">
+        <a:bodyPr spcFirstLastPara="0" vert="horz" wrap="square" lIns="87630" tIns="87630" rIns="87630" bIns="87630" numCol="1" spcCol="1270" anchor="ctr" anchorCtr="0">
           <a:noAutofit/>
         </a:bodyPr>
         <a:lstStyle/>
         <a:p>
-          <a:pPr marL="0" lvl="0" indent="0" algn="ctr" defTabSz="977900">
+          <a:pPr marL="0" lvl="0" indent="0" algn="ctr" defTabSz="1022350">
             <a:lnSpc>
               <a:spcPct val="90000"/>
             </a:lnSpc>
@@ -5272,14 +4018,14 @@
             <a:buNone/>
           </a:pPr>
           <a:r>
-            <a:rPr lang="en-US" sz="2200" kern="1200" dirty="0"/>
+            <a:rPr lang="en-US" sz="2300" kern="1200" dirty="0"/>
             <a:t>Sequence alignment</a:t>
           </a:r>
         </a:p>
       </dsp:txBody>
       <dsp:txXfrm>
-        <a:off x="3166337" y="132890"/>
-        <a:ext cx="1470205" cy="960220"/>
+        <a:off x="3149081" y="31762"/>
+        <a:ext cx="1541224" cy="1006605"/>
       </dsp:txXfrm>
     </dsp:sp>
     <dsp:sp modelId="{96C48980-A0CD-4E4A-BC68-F2194729EB0A}">
@@ -5289,8 +4035,8 @@
       </dsp:nvSpPr>
       <dsp:spPr>
         <a:xfrm>
-          <a:off x="2906970" y="1122985"/>
-          <a:ext cx="994469" cy="407987"/>
+          <a:off x="2877185" y="1069684"/>
+          <a:ext cx="1042508" cy="427695"/>
         </a:xfrm>
         <a:custGeom>
           <a:avLst/>
@@ -5301,16 +4047,16 @@
           <a:pathLst>
             <a:path>
               <a:moveTo>
-                <a:pt x="994469" y="0"/>
+                <a:pt x="1042508" y="0"/>
               </a:moveTo>
               <a:lnTo>
-                <a:pt x="994469" y="203993"/>
+                <a:pt x="1042508" y="213847"/>
               </a:lnTo>
               <a:lnTo>
-                <a:pt x="0" y="203993"/>
+                <a:pt x="0" y="213847"/>
               </a:lnTo>
               <a:lnTo>
-                <a:pt x="0" y="407987"/>
+                <a:pt x="0" y="427695"/>
               </a:lnTo>
             </a:path>
           </a:pathLst>
@@ -5351,8 +4097,8 @@
       </dsp:nvSpPr>
       <dsp:spPr>
         <a:xfrm>
-          <a:off x="2141993" y="1530973"/>
-          <a:ext cx="1529953" cy="1019968"/>
+          <a:off x="2075255" y="1497380"/>
+          <a:ext cx="1603858" cy="1069239"/>
         </a:xfrm>
         <a:prstGeom prst="roundRect">
           <a:avLst>
@@ -5396,12 +4142,12 @@
         </a:fontRef>
       </dsp:style>
       <dsp:txBody>
-        <a:bodyPr spcFirstLastPara="0" vert="horz" wrap="square" lIns="83820" tIns="83820" rIns="83820" bIns="83820" numCol="1" spcCol="1270" anchor="ctr" anchorCtr="0">
+        <a:bodyPr spcFirstLastPara="0" vert="horz" wrap="square" lIns="87630" tIns="87630" rIns="87630" bIns="87630" numCol="1" spcCol="1270" anchor="ctr" anchorCtr="0">
           <a:noAutofit/>
         </a:bodyPr>
         <a:lstStyle/>
         <a:p>
-          <a:pPr marL="0" lvl="0" indent="0" algn="ctr" defTabSz="977900">
+          <a:pPr marL="0" lvl="0" indent="0" algn="ctr" defTabSz="1022350">
             <a:lnSpc>
               <a:spcPct val="90000"/>
             </a:lnSpc>
@@ -5414,14 +4160,14 @@
             <a:buNone/>
           </a:pPr>
           <a:r>
-            <a:rPr lang="en-US" sz="2200" kern="1200" dirty="0"/>
+            <a:rPr lang="en-US" sz="2300" kern="1200" dirty="0"/>
             <a:t>RSEM</a:t>
           </a:r>
         </a:p>
       </dsp:txBody>
       <dsp:txXfrm>
-        <a:off x="2171867" y="1560847"/>
-        <a:ext cx="1470205" cy="960220"/>
+        <a:off x="2106572" y="1528697"/>
+        <a:ext cx="1541224" cy="1006605"/>
       </dsp:txXfrm>
     </dsp:sp>
     <dsp:sp modelId="{667A4CE5-1C37-4F92-B905-3AD81A3D9953}">
@@ -5431,8 +4177,8 @@
       </dsp:nvSpPr>
       <dsp:spPr>
         <a:xfrm>
-          <a:off x="3901440" y="1122985"/>
-          <a:ext cx="994469" cy="407987"/>
+          <a:off x="3919693" y="1069684"/>
+          <a:ext cx="1042508" cy="427695"/>
         </a:xfrm>
         <a:custGeom>
           <a:avLst/>
@@ -5446,13 +4192,13 @@
                 <a:pt x="0" y="0"/>
               </a:moveTo>
               <a:lnTo>
-                <a:pt x="0" y="203993"/>
+                <a:pt x="0" y="213847"/>
               </a:lnTo>
               <a:lnTo>
-                <a:pt x="994469" y="203993"/>
+                <a:pt x="1042508" y="213847"/>
               </a:lnTo>
               <a:lnTo>
-                <a:pt x="994469" y="407987"/>
+                <a:pt x="1042508" y="427695"/>
               </a:lnTo>
             </a:path>
           </a:pathLst>
@@ -5493,8 +4239,8 @@
       </dsp:nvSpPr>
       <dsp:spPr>
         <a:xfrm>
-          <a:off x="4130932" y="1530973"/>
-          <a:ext cx="1529953" cy="1019968"/>
+          <a:off x="4160272" y="1497380"/>
+          <a:ext cx="1603858" cy="1069239"/>
         </a:xfrm>
         <a:prstGeom prst="roundRect">
           <a:avLst>
@@ -5538,12 +4284,12 @@
         </a:fontRef>
       </dsp:style>
       <dsp:txBody>
-        <a:bodyPr spcFirstLastPara="0" vert="horz" wrap="square" lIns="83820" tIns="83820" rIns="83820" bIns="83820" numCol="1" spcCol="1270" anchor="ctr" anchorCtr="0">
+        <a:bodyPr spcFirstLastPara="0" vert="horz" wrap="square" lIns="87630" tIns="87630" rIns="87630" bIns="87630" numCol="1" spcCol="1270" anchor="ctr" anchorCtr="0">
           <a:noAutofit/>
         </a:bodyPr>
         <a:lstStyle/>
         <a:p>
-          <a:pPr marL="0" lvl="0" indent="0" algn="ctr" defTabSz="977900">
+          <a:pPr marL="0" lvl="0" indent="0" algn="ctr" defTabSz="1022350">
             <a:lnSpc>
               <a:spcPct val="90000"/>
             </a:lnSpc>
@@ -5556,14 +4302,14 @@
             <a:buNone/>
           </a:pPr>
           <a:r>
-            <a:rPr lang="en-US" sz="2200" kern="1200" dirty="0"/>
+            <a:rPr lang="en-US" sz="2300" kern="1200" dirty="0"/>
             <a:t>Bowtie2</a:t>
           </a:r>
         </a:p>
       </dsp:txBody>
       <dsp:txXfrm>
-        <a:off x="4160806" y="1560847"/>
-        <a:ext cx="1470205" cy="960220"/>
+        <a:off x="4191589" y="1528697"/>
+        <a:ext cx="1541224" cy="1006605"/>
       </dsp:txXfrm>
     </dsp:sp>
     <dsp:sp modelId="{6060F710-9C30-484B-BCA4-695BA2D8448A}">
@@ -5573,8 +4319,8 @@
       </dsp:nvSpPr>
       <dsp:spPr>
         <a:xfrm>
-          <a:off x="3891066" y="2550941"/>
-          <a:ext cx="1004842" cy="363506"/>
+          <a:off x="3908819" y="2566619"/>
+          <a:ext cx="1053382" cy="381066"/>
         </a:xfrm>
         <a:custGeom>
           <a:avLst/>
@@ -5585,16 +4331,16 @@
           <a:pathLst>
             <a:path>
               <a:moveTo>
-                <a:pt x="1004842" y="0"/>
+                <a:pt x="1053382" y="0"/>
               </a:moveTo>
               <a:lnTo>
-                <a:pt x="1004842" y="181753"/>
+                <a:pt x="1053382" y="190533"/>
               </a:lnTo>
               <a:lnTo>
-                <a:pt x="0" y="181753"/>
+                <a:pt x="0" y="190533"/>
               </a:lnTo>
               <a:lnTo>
-                <a:pt x="0" y="363506"/>
+                <a:pt x="0" y="381066"/>
               </a:lnTo>
             </a:path>
           </a:pathLst>
@@ -5635,8 +4381,8 @@
       </dsp:nvSpPr>
       <dsp:spPr>
         <a:xfrm>
-          <a:off x="3126090" y="2914448"/>
-          <a:ext cx="1529953" cy="1019968"/>
+          <a:off x="3106889" y="2947685"/>
+          <a:ext cx="1603858" cy="1069239"/>
         </a:xfrm>
         <a:prstGeom prst="roundRect">
           <a:avLst>
@@ -5680,12 +4426,12 @@
         </a:fontRef>
       </dsp:style>
       <dsp:txBody>
-        <a:bodyPr spcFirstLastPara="0" vert="horz" wrap="square" lIns="83820" tIns="83820" rIns="83820" bIns="83820" numCol="1" spcCol="1270" anchor="ctr" anchorCtr="0">
+        <a:bodyPr spcFirstLastPara="0" vert="horz" wrap="square" lIns="87630" tIns="87630" rIns="87630" bIns="87630" numCol="1" spcCol="1270" anchor="ctr" anchorCtr="0">
           <a:noAutofit/>
         </a:bodyPr>
         <a:lstStyle/>
         <a:p>
-          <a:pPr marL="0" lvl="0" indent="0" algn="ctr" defTabSz="977900">
+          <a:pPr marL="0" lvl="0" indent="0" algn="ctr" defTabSz="1022350">
             <a:lnSpc>
               <a:spcPct val="90000"/>
             </a:lnSpc>
@@ -5698,19 +4444,19 @@
             <a:buNone/>
           </a:pPr>
           <a:r>
-            <a:rPr lang="en-US" sz="2200" kern="1200" dirty="0"/>
+            <a:rPr lang="en-US" sz="2300" kern="1200" dirty="0"/>
             <a:t>Count Data for </a:t>
           </a:r>
           <a:r>
-            <a:rPr lang="en-US" sz="2200" kern="1200" dirty="0" err="1"/>
+            <a:rPr lang="en-US" sz="2300" kern="1200" dirty="0" err="1"/>
             <a:t>DESeq</a:t>
           </a:r>
-          <a:endParaRPr lang="en-US" sz="2200" kern="1200" dirty="0"/>
+          <a:endParaRPr lang="en-US" sz="2300" kern="1200" dirty="0"/>
         </a:p>
       </dsp:txBody>
       <dsp:txXfrm>
-        <a:off x="3155964" y="2944322"/>
-        <a:ext cx="1470205" cy="960220"/>
+        <a:off x="3138206" y="2979002"/>
+        <a:ext cx="1541224" cy="1006605"/>
       </dsp:txXfrm>
     </dsp:sp>
   </dsp:spTree>
@@ -5725,207 +4471,6 @@
       <dsp:cNvGrpSpPr/>
     </dsp:nvGrpSpPr>
     <dsp:grpSpPr/>
-    <dsp:sp modelId="{7EB3B241-9331-4643-88DB-BC87C28C8D72}">
-      <dsp:nvSpPr>
-        <dsp:cNvPr id="0" name=""/>
-        <dsp:cNvSpPr/>
-      </dsp:nvSpPr>
-      <dsp:spPr>
-        <a:xfrm>
-          <a:off x="0" y="2844989"/>
-          <a:ext cx="6096000" cy="1217990"/>
-        </a:xfrm>
-        <a:prstGeom prst="roundRect">
-          <a:avLst>
-            <a:gd name="adj" fmla="val 10000"/>
-          </a:avLst>
-        </a:prstGeom>
-        <a:solidFill>
-          <a:schemeClr val="accent1">
-            <a:tint val="40000"/>
-            <a:hueOff val="0"/>
-            <a:satOff val="0"/>
-            <a:lumOff val="0"/>
-            <a:alphaOff val="0"/>
-          </a:schemeClr>
-        </a:solidFill>
-        <a:ln>
-          <a:noFill/>
-        </a:ln>
-        <a:effectLst/>
-      </dsp:spPr>
-      <dsp:style>
-        <a:lnRef idx="0">
-          <a:scrgbClr r="0" g="0" b="0"/>
-        </a:lnRef>
-        <a:fillRef idx="1">
-          <a:scrgbClr r="0" g="0" b="0"/>
-        </a:fillRef>
-        <a:effectRef idx="0">
-          <a:scrgbClr r="0" g="0" b="0"/>
-        </a:effectRef>
-        <a:fontRef idx="minor"/>
-      </dsp:style>
-      <dsp:txBody>
-        <a:bodyPr spcFirstLastPara="0" vert="horz" wrap="square" lIns="298704" tIns="298704" rIns="298704" bIns="298704" numCol="1" spcCol="1270" anchor="ctr" anchorCtr="0">
-          <a:noAutofit/>
-        </a:bodyPr>
-        <a:lstStyle/>
-        <a:p>
-          <a:pPr marL="0" lvl="0" indent="0" algn="ctr" defTabSz="1866900">
-            <a:lnSpc>
-              <a:spcPct val="90000"/>
-            </a:lnSpc>
-            <a:spcBef>
-              <a:spcPct val="0"/>
-            </a:spcBef>
-            <a:spcAft>
-              <a:spcPct val="35000"/>
-            </a:spcAft>
-            <a:buNone/>
-          </a:pPr>
-          <a:endParaRPr lang="en-US" sz="4200" kern="1200" dirty="0"/>
-        </a:p>
-      </dsp:txBody>
-      <dsp:txXfrm>
-        <a:off x="0" y="2844989"/>
-        <a:ext cx="1828800" cy="1217990"/>
-      </dsp:txXfrm>
-    </dsp:sp>
-    <dsp:sp modelId="{A05F9B63-8F7E-4D2E-A54D-E75C443C0853}">
-      <dsp:nvSpPr>
-        <dsp:cNvPr id="0" name=""/>
-        <dsp:cNvSpPr/>
-      </dsp:nvSpPr>
-      <dsp:spPr>
-        <a:xfrm>
-          <a:off x="0" y="1423004"/>
-          <a:ext cx="6096000" cy="1217990"/>
-        </a:xfrm>
-        <a:prstGeom prst="roundRect">
-          <a:avLst>
-            <a:gd name="adj" fmla="val 10000"/>
-          </a:avLst>
-        </a:prstGeom>
-        <a:solidFill>
-          <a:schemeClr val="accent1">
-            <a:tint val="40000"/>
-            <a:hueOff val="0"/>
-            <a:satOff val="0"/>
-            <a:lumOff val="0"/>
-            <a:alphaOff val="0"/>
-          </a:schemeClr>
-        </a:solidFill>
-        <a:ln>
-          <a:noFill/>
-        </a:ln>
-        <a:effectLst/>
-      </dsp:spPr>
-      <dsp:style>
-        <a:lnRef idx="0">
-          <a:scrgbClr r="0" g="0" b="0"/>
-        </a:lnRef>
-        <a:fillRef idx="1">
-          <a:scrgbClr r="0" g="0" b="0"/>
-        </a:fillRef>
-        <a:effectRef idx="0">
-          <a:scrgbClr r="0" g="0" b="0"/>
-        </a:effectRef>
-        <a:fontRef idx="minor"/>
-      </dsp:style>
-      <dsp:txBody>
-        <a:bodyPr spcFirstLastPara="0" vert="horz" wrap="square" lIns="298704" tIns="298704" rIns="298704" bIns="298704" numCol="1" spcCol="1270" anchor="ctr" anchorCtr="0">
-          <a:noAutofit/>
-        </a:bodyPr>
-        <a:lstStyle/>
-        <a:p>
-          <a:pPr marL="0" lvl="0" indent="0" algn="ctr" defTabSz="1866900">
-            <a:lnSpc>
-              <a:spcPct val="90000"/>
-            </a:lnSpc>
-            <a:spcBef>
-              <a:spcPct val="0"/>
-            </a:spcBef>
-            <a:spcAft>
-              <a:spcPct val="35000"/>
-            </a:spcAft>
-            <a:buNone/>
-          </a:pPr>
-          <a:endParaRPr lang="en-US" sz="4200" kern="1200" dirty="0"/>
-        </a:p>
-      </dsp:txBody>
-      <dsp:txXfrm>
-        <a:off x="0" y="1423004"/>
-        <a:ext cx="1828800" cy="1217990"/>
-      </dsp:txXfrm>
-    </dsp:sp>
-    <dsp:sp modelId="{81D8F765-1C2B-47E8-9104-BC25204BF581}">
-      <dsp:nvSpPr>
-        <dsp:cNvPr id="0" name=""/>
-        <dsp:cNvSpPr/>
-      </dsp:nvSpPr>
-      <dsp:spPr>
-        <a:xfrm>
-          <a:off x="0" y="0"/>
-          <a:ext cx="6096000" cy="1217990"/>
-        </a:xfrm>
-        <a:prstGeom prst="roundRect">
-          <a:avLst>
-            <a:gd name="adj" fmla="val 10000"/>
-          </a:avLst>
-        </a:prstGeom>
-        <a:solidFill>
-          <a:schemeClr val="accent1">
-            <a:tint val="40000"/>
-            <a:hueOff val="0"/>
-            <a:satOff val="0"/>
-            <a:lumOff val="0"/>
-            <a:alphaOff val="0"/>
-          </a:schemeClr>
-        </a:solidFill>
-        <a:ln>
-          <a:noFill/>
-        </a:ln>
-        <a:effectLst/>
-      </dsp:spPr>
-      <dsp:style>
-        <a:lnRef idx="0">
-          <a:scrgbClr r="0" g="0" b="0"/>
-        </a:lnRef>
-        <a:fillRef idx="1">
-          <a:scrgbClr r="0" g="0" b="0"/>
-        </a:fillRef>
-        <a:effectRef idx="0">
-          <a:scrgbClr r="0" g="0" b="0"/>
-        </a:effectRef>
-        <a:fontRef idx="minor"/>
-      </dsp:style>
-      <dsp:txBody>
-        <a:bodyPr spcFirstLastPara="0" vert="horz" wrap="square" lIns="298704" tIns="298704" rIns="298704" bIns="298704" numCol="1" spcCol="1270" anchor="ctr" anchorCtr="0">
-          <a:noAutofit/>
-        </a:bodyPr>
-        <a:lstStyle/>
-        <a:p>
-          <a:pPr marL="0" lvl="0" indent="0" algn="ctr" defTabSz="1866900">
-            <a:lnSpc>
-              <a:spcPct val="90000"/>
-            </a:lnSpc>
-            <a:spcBef>
-              <a:spcPct val="0"/>
-            </a:spcBef>
-            <a:spcAft>
-              <a:spcPct val="35000"/>
-            </a:spcAft>
-            <a:buNone/>
-          </a:pPr>
-          <a:endParaRPr lang="en-US" sz="4200" kern="1200" dirty="0"/>
-        </a:p>
-      </dsp:txBody>
-      <dsp:txXfrm>
-        <a:off x="0" y="0"/>
-        <a:ext cx="1828800" cy="1217990"/>
-      </dsp:txXfrm>
-    </dsp:sp>
     <dsp:sp modelId="{DAEBC06F-7250-4148-A5DF-9E74C1131D38}">
       <dsp:nvSpPr>
         <dsp:cNvPr id="0" name=""/>
@@ -5933,8 +4478,8 @@
       </dsp:nvSpPr>
       <dsp:spPr>
         <a:xfrm>
-          <a:off x="3136463" y="103016"/>
-          <a:ext cx="1529953" cy="1019968"/>
+          <a:off x="2247304" y="3571"/>
+          <a:ext cx="1601390" cy="1067593"/>
         </a:xfrm>
         <a:prstGeom prst="roundRect">
           <a:avLst>
@@ -5978,12 +4523,12 @@
         </a:fontRef>
       </dsp:style>
       <dsp:txBody>
-        <a:bodyPr spcFirstLastPara="0" vert="horz" wrap="square" lIns="76200" tIns="76200" rIns="76200" bIns="76200" numCol="1" spcCol="1270" anchor="ctr" anchorCtr="0">
+        <a:bodyPr spcFirstLastPara="0" vert="horz" wrap="square" lIns="80010" tIns="80010" rIns="80010" bIns="80010" numCol="1" spcCol="1270" anchor="ctr" anchorCtr="0">
           <a:noAutofit/>
         </a:bodyPr>
         <a:lstStyle/>
         <a:p>
-          <a:pPr marL="0" lvl="0" indent="0" algn="ctr" defTabSz="889000">
+          <a:pPr marL="0" lvl="0" indent="0" algn="ctr" defTabSz="933450">
             <a:lnSpc>
               <a:spcPct val="90000"/>
             </a:lnSpc>
@@ -5996,14 +4541,14 @@
             <a:buNone/>
           </a:pPr>
           <a:r>
-            <a:rPr lang="en-US" sz="2000" kern="1200" dirty="0"/>
+            <a:rPr lang="en-US" sz="2100" kern="1200" dirty="0"/>
             <a:t>Count data</a:t>
           </a:r>
         </a:p>
       </dsp:txBody>
       <dsp:txXfrm>
-        <a:off x="3166337" y="132890"/>
-        <a:ext cx="1470205" cy="960220"/>
+        <a:off x="2278573" y="34840"/>
+        <a:ext cx="1538852" cy="1005055"/>
       </dsp:txXfrm>
     </dsp:sp>
     <dsp:sp modelId="{96C48980-A0CD-4E4A-BC68-F2194729EB0A}">
@@ -6013,8 +4558,8 @@
       </dsp:nvSpPr>
       <dsp:spPr>
         <a:xfrm>
-          <a:off x="3855720" y="1122985"/>
-          <a:ext cx="91440" cy="407987"/>
+          <a:off x="3002280" y="1071165"/>
+          <a:ext cx="91440" cy="427037"/>
         </a:xfrm>
         <a:custGeom>
           <a:avLst/>
@@ -6028,7 +4573,7 @@
                 <a:pt x="45720" y="0"/>
               </a:moveTo>
               <a:lnTo>
-                <a:pt x="45720" y="407987"/>
+                <a:pt x="45720" y="427037"/>
               </a:lnTo>
             </a:path>
           </a:pathLst>
@@ -6069,8 +4614,8 @@
       </dsp:nvSpPr>
       <dsp:spPr>
         <a:xfrm>
-          <a:off x="3136463" y="1530973"/>
-          <a:ext cx="1529953" cy="1019968"/>
+          <a:off x="2247304" y="1498203"/>
+          <a:ext cx="1601390" cy="1067593"/>
         </a:xfrm>
         <a:prstGeom prst="roundRect">
           <a:avLst>
@@ -6114,12 +4659,12 @@
         </a:fontRef>
       </dsp:style>
       <dsp:txBody>
-        <a:bodyPr spcFirstLastPara="0" vert="horz" wrap="square" lIns="76200" tIns="76200" rIns="76200" bIns="76200" numCol="1" spcCol="1270" anchor="ctr" anchorCtr="0">
+        <a:bodyPr spcFirstLastPara="0" vert="horz" wrap="square" lIns="80010" tIns="80010" rIns="80010" bIns="80010" numCol="1" spcCol="1270" anchor="ctr" anchorCtr="0">
           <a:noAutofit/>
         </a:bodyPr>
         <a:lstStyle/>
         <a:p>
-          <a:pPr marL="0" lvl="0" indent="0" algn="ctr" defTabSz="889000">
+          <a:pPr marL="0" lvl="0" indent="0" algn="ctr" defTabSz="933450">
             <a:lnSpc>
               <a:spcPct val="90000"/>
             </a:lnSpc>
@@ -6132,18 +4677,18 @@
             <a:buNone/>
           </a:pPr>
           <a:r>
-            <a:rPr lang="en-US" sz="2000" kern="1200" dirty="0" err="1"/>
+            <a:rPr lang="en-US" sz="2100" kern="1200" dirty="0" err="1"/>
             <a:t>DESeq</a:t>
           </a:r>
           <a:r>
-            <a:rPr lang="en-US" sz="2000" kern="1200" dirty="0"/>
+            <a:rPr lang="en-US" sz="2100" kern="1200" dirty="0"/>
             <a:t> normalized</a:t>
           </a:r>
         </a:p>
       </dsp:txBody>
       <dsp:txXfrm>
-        <a:off x="3166337" y="1560847"/>
-        <a:ext cx="1470205" cy="960220"/>
+        <a:off x="2278573" y="1529472"/>
+        <a:ext cx="1538852" cy="1005055"/>
       </dsp:txXfrm>
     </dsp:sp>
     <dsp:sp modelId="{ECFCD44B-153F-47BE-AC0B-085156E5B810}">
@@ -6153,8 +4698,8 @@
       </dsp:nvSpPr>
       <dsp:spPr>
         <a:xfrm>
-          <a:off x="3855720" y="2550941"/>
-          <a:ext cx="91440" cy="407987"/>
+          <a:off x="3002280" y="2565796"/>
+          <a:ext cx="91440" cy="427037"/>
         </a:xfrm>
         <a:custGeom>
           <a:avLst/>
@@ -6168,7 +4713,7 @@
                 <a:pt x="45720" y="0"/>
               </a:moveTo>
               <a:lnTo>
-                <a:pt x="45720" y="407987"/>
+                <a:pt x="45720" y="427037"/>
               </a:lnTo>
             </a:path>
           </a:pathLst>
@@ -6209,8 +4754,8 @@
       </dsp:nvSpPr>
       <dsp:spPr>
         <a:xfrm>
-          <a:off x="3136463" y="2958929"/>
-          <a:ext cx="1529953" cy="1019968"/>
+          <a:off x="2247304" y="2992834"/>
+          <a:ext cx="1601390" cy="1067593"/>
         </a:xfrm>
         <a:prstGeom prst="roundRect">
           <a:avLst>
@@ -6254,12 +4799,12 @@
         </a:fontRef>
       </dsp:style>
       <dsp:txBody>
-        <a:bodyPr spcFirstLastPara="0" vert="horz" wrap="square" lIns="76200" tIns="76200" rIns="76200" bIns="76200" numCol="1" spcCol="1270" anchor="ctr" anchorCtr="0">
+        <a:bodyPr spcFirstLastPara="0" vert="horz" wrap="square" lIns="80010" tIns="80010" rIns="80010" bIns="80010" numCol="1" spcCol="1270" anchor="ctr" anchorCtr="0">
           <a:noAutofit/>
         </a:bodyPr>
         <a:lstStyle/>
         <a:p>
-          <a:pPr marL="0" lvl="0" indent="0" algn="ctr" defTabSz="889000">
+          <a:pPr marL="0" lvl="0" indent="0" algn="ctr" defTabSz="933450">
             <a:lnSpc>
               <a:spcPct val="90000"/>
             </a:lnSpc>
@@ -6272,14 +4817,14 @@
             <a:buNone/>
           </a:pPr>
           <a:r>
-            <a:rPr lang="en-US" sz="2000" kern="1200" dirty="0"/>
+            <a:rPr lang="en-US" sz="2100" kern="1200" dirty="0"/>
             <a:t>Visualization</a:t>
           </a:r>
         </a:p>
       </dsp:txBody>
       <dsp:txXfrm>
-        <a:off x="3166337" y="2988803"/>
-        <a:ext cx="1470205" cy="960220"/>
+        <a:off x="2278573" y="3024103"/>
+        <a:ext cx="1538852" cy="1005055"/>
       </dsp:txXfrm>
     </dsp:sp>
   </dsp:spTree>
@@ -19202,14 +17747,14 @@
           <p:nvPr>
             <p:extLst>
               <p:ext uri="{D42A27DB-BD31-4B8C-83A1-F6EECF244321}">
-                <p14:modId xmlns:p14="http://schemas.microsoft.com/office/powerpoint/2010/main" val="981771673"/>
+                <p14:modId xmlns:p14="http://schemas.microsoft.com/office/powerpoint/2010/main" val="1445895160"/>
               </p:ext>
             </p:extLst>
           </p:nvPr>
         </p:nvGraphicFramePr>
         <p:xfrm>
-          <a:off x="852792" y="1726252"/>
-          <a:ext cx="6096000" cy="4064000"/>
+          <a:off x="852792" y="1521857"/>
+          <a:ext cx="7376808" cy="5131748"/>
         </p:xfrm>
         <a:graphic>
           <a:graphicData uri="http://schemas.openxmlformats.org/drawingml/2006/diagram">
@@ -19525,14 +18070,14 @@
           <p:nvPr>
             <p:extLst>
               <p:ext uri="{D42A27DB-BD31-4B8C-83A1-F6EECF244321}">
-                <p14:modId xmlns:p14="http://schemas.microsoft.com/office/powerpoint/2010/main" val="2475013993"/>
+                <p14:modId xmlns:p14="http://schemas.microsoft.com/office/powerpoint/2010/main" val="801953623"/>
               </p:ext>
             </p:extLst>
           </p:nvPr>
         </p:nvGraphicFramePr>
         <p:xfrm>
           <a:off x="852792" y="1726252"/>
-          <a:ext cx="6096000" cy="4064000"/>
+          <a:ext cx="7839387" cy="4064000"/>
         </p:xfrm>
         <a:graphic>
           <a:graphicData uri="http://schemas.openxmlformats.org/drawingml/2006/diagram">
@@ -19994,13 +18539,13 @@
           <p:nvPr>
             <p:extLst>
               <p:ext uri="{D42A27DB-BD31-4B8C-83A1-F6EECF244321}">
-                <p14:modId xmlns:p14="http://schemas.microsoft.com/office/powerpoint/2010/main" val="3965263398"/>
+                <p14:modId xmlns:p14="http://schemas.microsoft.com/office/powerpoint/2010/main" val="4138148851"/>
               </p:ext>
             </p:extLst>
           </p:nvPr>
         </p:nvGraphicFramePr>
         <p:xfrm>
-          <a:off x="852792" y="1726252"/>
+          <a:off x="1524000" y="1976772"/>
           <a:ext cx="6096000" cy="4064000"/>
         </p:xfrm>
         <a:graphic>

</xml_diff>